<commit_message>
reduced perceptual schemas to 1 box
</commit_message>
<xml_diff>
--- a/UAVbehavior/TRM/Diagrams/Overall behavior subsumption.pptx
+++ b/UAVbehavior/TRM/Diagrams/Overall behavior subsumption.pptx
@@ -6,6 +6,7 @@
   </p:sldMasterIdLst>
   <p:sldIdLst>
     <p:sldId id="256" r:id="rId2"/>
+    <p:sldId id="257" r:id="rId3"/>
   </p:sldIdLst>
   <p:sldSz cx="9144000" cy="6858000" type="screen4x3"/>
   <p:notesSz cx="6858000" cy="9144000"/>
@@ -288,7 +289,8 @@
           <a:p>
             <a:fld id="{74E52EF6-59E7-4A14-BDBC-4299BEA7E196}" type="datetimeFigureOut">
               <a:rPr lang="en-US" smtClean="0"/>
-              <a:t>11/23/2013</a:t>
+              <a:pPr/>
+              <a:t>11/24/2013</a:t>
             </a:fld>
             <a:endParaRPr lang="en-US"/>
           </a:p>
@@ -330,6 +332,7 @@
           <a:p>
             <a:fld id="{F88F9BD7-D928-4BA0-BD0B-2DA8C8514FA8}" type="slidenum">
               <a:rPr lang="en-US" smtClean="0"/>
+              <a:pPr/>
               <a:t>‹#›</a:t>
             </a:fld>
             <a:endParaRPr lang="en-US"/>
@@ -453,7 +456,8 @@
           <a:p>
             <a:fld id="{74E52EF6-59E7-4A14-BDBC-4299BEA7E196}" type="datetimeFigureOut">
               <a:rPr lang="en-US" smtClean="0"/>
-              <a:t>11/23/2013</a:t>
+              <a:pPr/>
+              <a:t>11/24/2013</a:t>
             </a:fld>
             <a:endParaRPr lang="en-US"/>
           </a:p>
@@ -495,6 +499,7 @@
           <a:p>
             <a:fld id="{F88F9BD7-D928-4BA0-BD0B-2DA8C8514FA8}" type="slidenum">
               <a:rPr lang="en-US" smtClean="0"/>
+              <a:pPr/>
               <a:t>‹#›</a:t>
             </a:fld>
             <a:endParaRPr lang="en-US"/>
@@ -628,7 +633,8 @@
           <a:p>
             <a:fld id="{74E52EF6-59E7-4A14-BDBC-4299BEA7E196}" type="datetimeFigureOut">
               <a:rPr lang="en-US" smtClean="0"/>
-              <a:t>11/23/2013</a:t>
+              <a:pPr/>
+              <a:t>11/24/2013</a:t>
             </a:fld>
             <a:endParaRPr lang="en-US"/>
           </a:p>
@@ -670,6 +676,7 @@
           <a:p>
             <a:fld id="{F88F9BD7-D928-4BA0-BD0B-2DA8C8514FA8}" type="slidenum">
               <a:rPr lang="en-US" smtClean="0"/>
+              <a:pPr/>
               <a:t>‹#›</a:t>
             </a:fld>
             <a:endParaRPr lang="en-US"/>
@@ -793,7 +800,8 @@
           <a:p>
             <a:fld id="{74E52EF6-59E7-4A14-BDBC-4299BEA7E196}" type="datetimeFigureOut">
               <a:rPr lang="en-US" smtClean="0"/>
-              <a:t>11/23/2013</a:t>
+              <a:pPr/>
+              <a:t>11/24/2013</a:t>
             </a:fld>
             <a:endParaRPr lang="en-US"/>
           </a:p>
@@ -835,6 +843,7 @@
           <a:p>
             <a:fld id="{F88F9BD7-D928-4BA0-BD0B-2DA8C8514FA8}" type="slidenum">
               <a:rPr lang="en-US" smtClean="0"/>
+              <a:pPr/>
               <a:t>‹#›</a:t>
             </a:fld>
             <a:endParaRPr lang="en-US"/>
@@ -1034,7 +1043,8 @@
           <a:p>
             <a:fld id="{74E52EF6-59E7-4A14-BDBC-4299BEA7E196}" type="datetimeFigureOut">
               <a:rPr lang="en-US" smtClean="0"/>
-              <a:t>11/23/2013</a:t>
+              <a:pPr/>
+              <a:t>11/24/2013</a:t>
             </a:fld>
             <a:endParaRPr lang="en-US"/>
           </a:p>
@@ -1076,6 +1086,7 @@
           <a:p>
             <a:fld id="{F88F9BD7-D928-4BA0-BD0B-2DA8C8514FA8}" type="slidenum">
               <a:rPr lang="en-US" smtClean="0"/>
+              <a:pPr/>
               <a:t>‹#›</a:t>
             </a:fld>
             <a:endParaRPr lang="en-US"/>
@@ -1317,7 +1328,8 @@
           <a:p>
             <a:fld id="{74E52EF6-59E7-4A14-BDBC-4299BEA7E196}" type="datetimeFigureOut">
               <a:rPr lang="en-US" smtClean="0"/>
-              <a:t>11/23/2013</a:t>
+              <a:pPr/>
+              <a:t>11/24/2013</a:t>
             </a:fld>
             <a:endParaRPr lang="en-US"/>
           </a:p>
@@ -1359,6 +1371,7 @@
           <a:p>
             <a:fld id="{F88F9BD7-D928-4BA0-BD0B-2DA8C8514FA8}" type="slidenum">
               <a:rPr lang="en-US" smtClean="0"/>
+              <a:pPr/>
               <a:t>‹#›</a:t>
             </a:fld>
             <a:endParaRPr lang="en-US"/>
@@ -1734,7 +1747,8 @@
           <a:p>
             <a:fld id="{74E52EF6-59E7-4A14-BDBC-4299BEA7E196}" type="datetimeFigureOut">
               <a:rPr lang="en-US" smtClean="0"/>
-              <a:t>11/23/2013</a:t>
+              <a:pPr/>
+              <a:t>11/24/2013</a:t>
             </a:fld>
             <a:endParaRPr lang="en-US"/>
           </a:p>
@@ -1776,6 +1790,7 @@
           <a:p>
             <a:fld id="{F88F9BD7-D928-4BA0-BD0B-2DA8C8514FA8}" type="slidenum">
               <a:rPr lang="en-US" smtClean="0"/>
+              <a:pPr/>
               <a:t>‹#›</a:t>
             </a:fld>
             <a:endParaRPr lang="en-US"/>
@@ -1847,7 +1862,8 @@
           <a:p>
             <a:fld id="{74E52EF6-59E7-4A14-BDBC-4299BEA7E196}" type="datetimeFigureOut">
               <a:rPr lang="en-US" smtClean="0"/>
-              <a:t>11/23/2013</a:t>
+              <a:pPr/>
+              <a:t>11/24/2013</a:t>
             </a:fld>
             <a:endParaRPr lang="en-US"/>
           </a:p>
@@ -1889,6 +1905,7 @@
           <a:p>
             <a:fld id="{F88F9BD7-D928-4BA0-BD0B-2DA8C8514FA8}" type="slidenum">
               <a:rPr lang="en-US" smtClean="0"/>
+              <a:pPr/>
               <a:t>‹#›</a:t>
             </a:fld>
             <a:endParaRPr lang="en-US"/>
@@ -1937,7 +1954,8 @@
           <a:p>
             <a:fld id="{74E52EF6-59E7-4A14-BDBC-4299BEA7E196}" type="datetimeFigureOut">
               <a:rPr lang="en-US" smtClean="0"/>
-              <a:t>11/23/2013</a:t>
+              <a:pPr/>
+              <a:t>11/24/2013</a:t>
             </a:fld>
             <a:endParaRPr lang="en-US"/>
           </a:p>
@@ -1979,6 +1997,7 @@
           <a:p>
             <a:fld id="{F88F9BD7-D928-4BA0-BD0B-2DA8C8514FA8}" type="slidenum">
               <a:rPr lang="en-US" smtClean="0"/>
+              <a:pPr/>
               <a:t>‹#›</a:t>
             </a:fld>
             <a:endParaRPr lang="en-US"/>
@@ -2209,7 +2228,8 @@
           <a:p>
             <a:fld id="{74E52EF6-59E7-4A14-BDBC-4299BEA7E196}" type="datetimeFigureOut">
               <a:rPr lang="en-US" smtClean="0"/>
-              <a:t>11/23/2013</a:t>
+              <a:pPr/>
+              <a:t>11/24/2013</a:t>
             </a:fld>
             <a:endParaRPr lang="en-US"/>
           </a:p>
@@ -2251,6 +2271,7 @@
           <a:p>
             <a:fld id="{F88F9BD7-D928-4BA0-BD0B-2DA8C8514FA8}" type="slidenum">
               <a:rPr lang="en-US" smtClean="0"/>
+              <a:pPr/>
               <a:t>‹#›</a:t>
             </a:fld>
             <a:endParaRPr lang="en-US"/>
@@ -2457,7 +2478,8 @@
           <a:p>
             <a:fld id="{74E52EF6-59E7-4A14-BDBC-4299BEA7E196}" type="datetimeFigureOut">
               <a:rPr lang="en-US" smtClean="0"/>
-              <a:t>11/23/2013</a:t>
+              <a:pPr/>
+              <a:t>11/24/2013</a:t>
             </a:fld>
             <a:endParaRPr lang="en-US"/>
           </a:p>
@@ -2499,6 +2521,7 @@
           <a:p>
             <a:fld id="{F88F9BD7-D928-4BA0-BD0B-2DA8C8514FA8}" type="slidenum">
               <a:rPr lang="en-US" smtClean="0"/>
+              <a:pPr/>
               <a:t>‹#›</a:t>
             </a:fld>
             <a:endParaRPr lang="en-US"/>
@@ -2665,7 +2688,8 @@
           <a:p>
             <a:fld id="{74E52EF6-59E7-4A14-BDBC-4299BEA7E196}" type="datetimeFigureOut">
               <a:rPr lang="en-US" smtClean="0"/>
-              <a:t>11/23/2013</a:t>
+              <a:pPr/>
+              <a:t>11/24/2013</a:t>
             </a:fld>
             <a:endParaRPr lang="en-US"/>
           </a:p>
@@ -2743,6 +2767,7 @@
           <a:p>
             <a:fld id="{F88F9BD7-D928-4BA0-BD0B-2DA8C8514FA8}" type="slidenum">
               <a:rPr lang="en-US" smtClean="0"/>
+              <a:pPr/>
               <a:t>‹#›</a:t>
             </a:fld>
             <a:endParaRPr lang="en-US"/>
@@ -3043,8 +3068,8 @@
         </p:nvSpPr>
         <p:spPr>
           <a:xfrm>
-            <a:off x="2362200" y="457200"/>
-            <a:ext cx="3962400" cy="1219200"/>
+            <a:off x="4648200" y="457200"/>
+            <a:ext cx="1676400" cy="1219200"/>
           </a:xfrm>
           <a:prstGeom prst="rect">
             <a:avLst/>
@@ -3092,8 +3117,8 @@
         </p:nvSpPr>
         <p:spPr>
           <a:xfrm>
-            <a:off x="2362200" y="2133600"/>
-            <a:ext cx="3962400" cy="1219200"/>
+            <a:off x="4648200" y="2133600"/>
+            <a:ext cx="1676400" cy="1219200"/>
           </a:xfrm>
           <a:prstGeom prst="rect">
             <a:avLst/>
@@ -3141,8 +3166,8 @@
         </p:nvSpPr>
         <p:spPr>
           <a:xfrm>
-            <a:off x="2362200" y="3810000"/>
-            <a:ext cx="3962400" cy="1219200"/>
+            <a:off x="4648200" y="3810000"/>
+            <a:ext cx="1676400" cy="1219200"/>
           </a:xfrm>
           <a:prstGeom prst="rect">
             <a:avLst/>
@@ -3190,8 +3215,8 @@
         </p:nvSpPr>
         <p:spPr>
           <a:xfrm>
-            <a:off x="2362200" y="5486400"/>
-            <a:ext cx="3962400" cy="1219200"/>
+            <a:off x="4648200" y="5486400"/>
+            <a:ext cx="1676400" cy="1219200"/>
           </a:xfrm>
           <a:prstGeom prst="rect">
             <a:avLst/>
@@ -3239,7 +3264,7 @@
         </p:nvSpPr>
         <p:spPr>
           <a:xfrm>
-            <a:off x="3429000" y="152400"/>
+            <a:off x="4419600" y="152400"/>
             <a:ext cx="1828800" cy="369332"/>
           </a:xfrm>
           <a:prstGeom prst="rect">
@@ -3269,7 +3294,7 @@
         </p:nvSpPr>
         <p:spPr>
           <a:xfrm>
-            <a:off x="3505200" y="1828800"/>
+            <a:off x="4495800" y="1828800"/>
             <a:ext cx="1828800" cy="369332"/>
           </a:xfrm>
           <a:prstGeom prst="rect">
@@ -3299,7 +3324,7 @@
         </p:nvSpPr>
         <p:spPr>
           <a:xfrm>
-            <a:off x="3505200" y="3505200"/>
+            <a:off x="4495800" y="3505200"/>
             <a:ext cx="1828800" cy="369332"/>
           </a:xfrm>
           <a:prstGeom prst="rect">
@@ -3329,7 +3354,7 @@
         </p:nvSpPr>
         <p:spPr>
           <a:xfrm>
-            <a:off x="3505200" y="5181600"/>
+            <a:off x="4495800" y="5181600"/>
             <a:ext cx="1828800" cy="369332"/>
           </a:xfrm>
           <a:prstGeom prst="rect">
@@ -3351,96 +3376,81 @@
           </a:p>
         </p:txBody>
       </p:sp>
-      <p:grpSp>
-        <p:nvGrpSpPr>
-          <p:cNvPr id="98" name="Group 97"/>
-          <p:cNvGrpSpPr/>
+      <p:sp>
+        <p:nvSpPr>
+          <p:cNvPr id="13" name="Rectangle 12"/>
+          <p:cNvSpPr/>
           <p:nvPr/>
-        </p:nvGrpSpPr>
-        <p:grpSpPr>
+        </p:nvSpPr>
+        <p:spPr>
           <a:xfrm>
             <a:off x="0" y="4419600"/>
             <a:ext cx="914400" cy="533400"/>
-            <a:chOff x="228600" y="4876800"/>
-            <a:chExt cx="914400" cy="533400"/>
-          </a:xfrm>
-        </p:grpSpPr>
-        <p:sp>
-          <p:nvSpPr>
-            <p:cNvPr id="13" name="Rectangle 12"/>
-            <p:cNvSpPr/>
-            <p:nvPr/>
-          </p:nvSpPr>
-          <p:spPr>
-            <a:xfrm>
-              <a:off x="228600" y="4876800"/>
-              <a:ext cx="914400" cy="533400"/>
-            </a:xfrm>
-            <a:prstGeom prst="rect">
-              <a:avLst/>
-            </a:prstGeom>
-            <a:solidFill>
-              <a:schemeClr val="tx2">
-                <a:lumMod val="20000"/>
-                <a:lumOff val="80000"/>
-              </a:schemeClr>
-            </a:solidFill>
-          </p:spPr>
-          <p:style>
-            <a:lnRef idx="2">
-              <a:schemeClr val="accent1">
-                <a:shade val="50000"/>
-              </a:schemeClr>
-            </a:lnRef>
-            <a:fillRef idx="1">
-              <a:schemeClr val="accent1"/>
-            </a:fillRef>
-            <a:effectRef idx="0">
-              <a:schemeClr val="accent1"/>
-            </a:effectRef>
-            <a:fontRef idx="minor">
-              <a:schemeClr val="lt1"/>
-            </a:fontRef>
-          </p:style>
-          <p:txBody>
-            <a:bodyPr rtlCol="0" anchor="ctr"/>
-            <a:lstStyle/>
-            <a:p>
-              <a:pPr algn="ctr"/>
-              <a:endParaRPr lang="en-US"/>
-            </a:p>
-          </p:txBody>
-        </p:sp>
-        <p:sp>
-          <p:nvSpPr>
-            <p:cNvPr id="14" name="TextBox 13"/>
-            <p:cNvSpPr txBox="1"/>
-            <p:nvPr/>
-          </p:nvSpPr>
-          <p:spPr>
-            <a:xfrm>
-              <a:off x="228600" y="4953000"/>
-              <a:ext cx="914400" cy="369332"/>
-            </a:xfrm>
-            <a:prstGeom prst="rect">
-              <a:avLst/>
-            </a:prstGeom>
-            <a:noFill/>
-          </p:spPr>
-          <p:txBody>
-            <a:bodyPr wrap="square" rtlCol="0">
-              <a:spAutoFit/>
-            </a:bodyPr>
-            <a:lstStyle/>
-            <a:p>
-              <a:r>
-                <a:rPr lang="en-US" dirty="0" smtClean="0"/>
-                <a:t>Hokuyo</a:t>
-              </a:r>
-            </a:p>
-          </p:txBody>
-        </p:sp>
-      </p:grpSp>
+          </a:xfrm>
+          <a:prstGeom prst="rect">
+            <a:avLst/>
+          </a:prstGeom>
+          <a:solidFill>
+            <a:schemeClr val="accent2">
+              <a:lumMod val="20000"/>
+              <a:lumOff val="80000"/>
+            </a:schemeClr>
+          </a:solidFill>
+        </p:spPr>
+        <p:style>
+          <a:lnRef idx="2">
+            <a:schemeClr val="accent1">
+              <a:shade val="50000"/>
+            </a:schemeClr>
+          </a:lnRef>
+          <a:fillRef idx="1">
+            <a:schemeClr val="accent1"/>
+          </a:fillRef>
+          <a:effectRef idx="0">
+            <a:schemeClr val="accent1"/>
+          </a:effectRef>
+          <a:fontRef idx="minor">
+            <a:schemeClr val="lt1"/>
+          </a:fontRef>
+        </p:style>
+        <p:txBody>
+          <a:bodyPr rtlCol="0" anchor="ctr"/>
+          <a:lstStyle/>
+          <a:p>
+            <a:pPr algn="ctr"/>
+            <a:endParaRPr lang="en-US"/>
+          </a:p>
+        </p:txBody>
+      </p:sp>
+      <p:sp>
+        <p:nvSpPr>
+          <p:cNvPr id="14" name="TextBox 13"/>
+          <p:cNvSpPr txBox="1"/>
+          <p:nvPr/>
+        </p:nvSpPr>
+        <p:spPr>
+          <a:xfrm>
+            <a:off x="0" y="4495800"/>
+            <a:ext cx="914400" cy="369332"/>
+          </a:xfrm>
+          <a:prstGeom prst="rect">
+            <a:avLst/>
+          </a:prstGeom>
+          <a:noFill/>
+        </p:spPr>
+        <p:txBody>
+          <a:bodyPr wrap="square" rtlCol="0">
+            <a:spAutoFit/>
+          </a:bodyPr>
+          <a:lstStyle/>
+          <a:p>
+            <a:r>
+              <a:rPr lang="en-US" dirty="0" smtClean="0"/>
+              <a:t>Hokuyo</a:t>
+            </a:r>
+          </a:p>
+        </p:txBody>
+      </p:sp>
       <p:grpSp>
         <p:nvGrpSpPr>
           <p:cNvPr id="97" name="Group 96"/>
@@ -3548,7 +3558,7 @@
           <a:prstGeom prst="bentConnector2">
             <a:avLst/>
           </a:prstGeom>
-          <a:ln>
+          <a:ln w="22225">
             <a:tailEnd type="arrow"/>
           </a:ln>
         </p:spPr>
@@ -3583,6 +3593,7 @@
           <a:prstGeom prst="line">
             <a:avLst/>
           </a:prstGeom>
+          <a:ln w="22225"/>
         </p:spPr>
         <p:style>
           <a:lnRef idx="1">
@@ -3692,148 +3703,133 @@
           </p:txBody>
         </p:sp>
       </p:grpSp>
+      <p:cxnSp>
+        <p:nvCxnSpPr>
+          <p:cNvPr id="19" name="Shape 18"/>
+          <p:cNvCxnSpPr/>
+          <p:nvPr/>
+        </p:nvCxnSpPr>
+        <p:spPr>
+          <a:xfrm rot="16200000" flipH="1">
+            <a:off x="6274917" y="3402483"/>
+            <a:ext cx="1636067" cy="165100"/>
+          </a:xfrm>
+          <a:prstGeom prst="bentConnector3">
+            <a:avLst>
+              <a:gd name="adj1" fmla="val 884"/>
+            </a:avLst>
+          </a:prstGeom>
+          <a:ln w="22225">
+            <a:tailEnd type="arrow"/>
+          </a:ln>
+        </p:spPr>
+        <p:style>
+          <a:lnRef idx="1">
+            <a:schemeClr val="accent1"/>
+          </a:lnRef>
+          <a:fillRef idx="0">
+            <a:schemeClr val="accent1"/>
+          </a:fillRef>
+          <a:effectRef idx="0">
+            <a:schemeClr val="accent1"/>
+          </a:effectRef>
+          <a:fontRef idx="minor">
+            <a:schemeClr val="tx1"/>
+          </a:fontRef>
+        </p:style>
+      </p:cxnSp>
       <p:grpSp>
         <p:nvGrpSpPr>
-          <p:cNvPr id="71" name="Group 70"/>
+          <p:cNvPr id="65" name="Group 64"/>
           <p:cNvGrpSpPr/>
           <p:nvPr/>
         </p:nvGrpSpPr>
         <p:grpSpPr>
           <a:xfrm>
-            <a:off x="7010400" y="2666999"/>
-            <a:ext cx="457200" cy="2017068"/>
-            <a:chOff x="7162800" y="2402532"/>
-            <a:chExt cx="457200" cy="2017068"/>
+            <a:off x="7010400" y="4150667"/>
+            <a:ext cx="457200" cy="533400"/>
+            <a:chOff x="6629400" y="2362200"/>
+            <a:chExt cx="457200" cy="533400"/>
           </a:xfrm>
         </p:grpSpPr>
-        <p:cxnSp>
-          <p:nvCxnSpPr>
-            <p:cNvPr id="19" name="Shape 18"/>
-            <p:cNvCxnSpPr/>
+        <p:sp>
+          <p:nvSpPr>
+            <p:cNvPr id="66" name="Oval 65"/>
+            <p:cNvSpPr/>
             <p:nvPr/>
-          </p:nvCxnSpPr>
+          </p:nvSpPr>
           <p:spPr>
-            <a:xfrm rot="16200000" flipH="1">
-              <a:off x="6427317" y="3138016"/>
-              <a:ext cx="1636067" cy="165100"/>
+            <a:xfrm>
+              <a:off x="6629400" y="2514600"/>
+              <a:ext cx="381000" cy="381000"/>
             </a:xfrm>
-            <a:prstGeom prst="bentConnector3">
-              <a:avLst>
-                <a:gd name="adj1" fmla="val 884"/>
-              </a:avLst>
+            <a:prstGeom prst="ellipse">
+              <a:avLst/>
             </a:prstGeom>
+            <a:solidFill>
+              <a:schemeClr val="bg1"/>
+            </a:solidFill>
             <a:ln>
-              <a:tailEnd type="arrow"/>
+              <a:solidFill>
+                <a:schemeClr val="tx1"/>
+              </a:solidFill>
             </a:ln>
           </p:spPr>
           <p:style>
-            <a:lnRef idx="1">
-              <a:schemeClr val="accent1"/>
+            <a:lnRef idx="2">
+              <a:schemeClr val="accent1">
+                <a:shade val="50000"/>
+              </a:schemeClr>
             </a:lnRef>
-            <a:fillRef idx="0">
+            <a:fillRef idx="1">
               <a:schemeClr val="accent1"/>
             </a:fillRef>
             <a:effectRef idx="0">
               <a:schemeClr val="accent1"/>
             </a:effectRef>
             <a:fontRef idx="minor">
-              <a:schemeClr val="tx1"/>
+              <a:schemeClr val="lt1"/>
             </a:fontRef>
           </p:style>
-        </p:cxnSp>
-        <p:grpSp>
-          <p:nvGrpSpPr>
-            <p:cNvPr id="65" name="Group 64"/>
-            <p:cNvGrpSpPr/>
+          <p:txBody>
+            <a:bodyPr rtlCol="0" anchor="ctr"/>
+            <a:lstStyle/>
+            <a:p>
+              <a:pPr algn="ctr"/>
+              <a:endParaRPr lang="en-US"/>
+            </a:p>
+          </p:txBody>
+        </p:sp>
+        <p:sp>
+          <p:nvSpPr>
+            <p:cNvPr id="67" name="TextBox 66"/>
+            <p:cNvSpPr txBox="1"/>
             <p:nvPr/>
-          </p:nvGrpSpPr>
-          <p:grpSpPr>
+          </p:nvSpPr>
+          <p:spPr>
             <a:xfrm>
-              <a:off x="7162800" y="3886200"/>
-              <a:ext cx="457200" cy="533400"/>
-              <a:chOff x="6629400" y="2362200"/>
-              <a:chExt cx="457200" cy="533400"/>
+              <a:off x="6629400" y="2362200"/>
+              <a:ext cx="457200" cy="461665"/>
             </a:xfrm>
-          </p:grpSpPr>
-          <p:sp>
-            <p:nvSpPr>
-              <p:cNvPr id="66" name="Oval 65"/>
-              <p:cNvSpPr/>
-              <p:nvPr/>
-            </p:nvSpPr>
-            <p:spPr>
-              <a:xfrm>
-                <a:off x="6629400" y="2514600"/>
-                <a:ext cx="381000" cy="381000"/>
-              </a:xfrm>
-              <a:prstGeom prst="ellipse">
-                <a:avLst/>
-              </a:prstGeom>
-              <a:solidFill>
-                <a:schemeClr val="bg1"/>
-              </a:solidFill>
-              <a:ln>
-                <a:solidFill>
-                  <a:schemeClr val="tx1"/>
-                </a:solidFill>
-              </a:ln>
-            </p:spPr>
-            <p:style>
-              <a:lnRef idx="2">
-                <a:schemeClr val="accent1">
-                  <a:shade val="50000"/>
-                </a:schemeClr>
-              </a:lnRef>
-              <a:fillRef idx="1">
-                <a:schemeClr val="accent1"/>
-              </a:fillRef>
-              <a:effectRef idx="0">
-                <a:schemeClr val="accent1"/>
-              </a:effectRef>
-              <a:fontRef idx="minor">
-                <a:schemeClr val="lt1"/>
-              </a:fontRef>
-            </p:style>
-            <p:txBody>
-              <a:bodyPr rtlCol="0" anchor="ctr"/>
-              <a:lstStyle/>
-              <a:p>
-                <a:pPr algn="ctr"/>
-                <a:endParaRPr lang="en-US"/>
-              </a:p>
-            </p:txBody>
-          </p:sp>
-          <p:sp>
-            <p:nvSpPr>
-              <p:cNvPr id="67" name="TextBox 66"/>
-              <p:cNvSpPr txBox="1"/>
-              <p:nvPr/>
-            </p:nvSpPr>
-            <p:spPr>
-              <a:xfrm>
-                <a:off x="6629400" y="2362200"/>
-                <a:ext cx="457200" cy="461665"/>
-              </a:xfrm>
-              <a:prstGeom prst="rect">
-                <a:avLst/>
-              </a:prstGeom>
-              <a:noFill/>
-            </p:spPr>
-            <p:txBody>
-              <a:bodyPr wrap="square" rtlCol="0">
-                <a:spAutoFit/>
-              </a:bodyPr>
-              <a:lstStyle/>
-              <a:p>
-                <a:r>
-                  <a:rPr lang="en-US" sz="3600" b="1" baseline="-25000" dirty="0" smtClean="0"/>
-                  <a:t>S</a:t>
-                </a:r>
-                <a:endParaRPr lang="en-US" b="1" baseline="-25000" dirty="0"/>
-              </a:p>
-            </p:txBody>
-          </p:sp>
-        </p:grpSp>
+            <a:prstGeom prst="rect">
+              <a:avLst/>
+            </a:prstGeom>
+            <a:noFill/>
+          </p:spPr>
+          <p:txBody>
+            <a:bodyPr wrap="square" rtlCol="0">
+              <a:spAutoFit/>
+            </a:bodyPr>
+            <a:lstStyle/>
+            <a:p>
+              <a:r>
+                <a:rPr lang="en-US" sz="3600" b="1" baseline="-25000" dirty="0" smtClean="0"/>
+                <a:t>S</a:t>
+              </a:r>
+              <a:endParaRPr lang="en-US" b="1" baseline="-25000" dirty="0"/>
+            </a:p>
+          </p:txBody>
+        </p:sp>
       </p:grpSp>
       <p:cxnSp>
         <p:nvCxnSpPr>
@@ -3849,6 +3845,7 @@
           <a:prstGeom prst="line">
             <a:avLst/>
           </a:prstGeom>
+          <a:ln w="22225"/>
         </p:spPr>
         <p:style>
           <a:lnRef idx="1">
@@ -3974,7 +3971,7 @@
               <a:gd name="adj1" fmla="val -1136"/>
             </a:avLst>
           </a:prstGeom>
-          <a:ln>
+          <a:ln w="22225">
             <a:tailEnd type="arrow"/>
           </a:ln>
         </p:spPr>
@@ -3996,20 +3993,18 @@
       <p:cxnSp>
         <p:nvCxnSpPr>
           <p:cNvPr id="94" name="Straight Arrow Connector 93"/>
-          <p:cNvCxnSpPr>
-            <a:stCxn id="7" idx="3"/>
-          </p:cNvCxnSpPr>
+          <p:cNvCxnSpPr/>
           <p:nvPr/>
         </p:nvCxnSpPr>
         <p:spPr>
-          <a:xfrm flipV="1">
+          <a:xfrm>
             <a:off x="6324600" y="6019800"/>
-            <a:ext cx="914400" cy="76200"/>
+            <a:ext cx="990600" cy="0"/>
           </a:xfrm>
           <a:prstGeom prst="straightConnector1">
             <a:avLst/>
           </a:prstGeom>
-          <a:ln>
+          <a:ln w="22225">
             <a:tailEnd type="arrow"/>
           </a:ln>
         </p:spPr>
@@ -4042,7 +4037,7 @@
           <a:prstGeom prst="straightConnector1">
             <a:avLst/>
           </a:prstGeom>
-          <a:ln>
+          <a:ln w="22225">
             <a:tailEnd type="arrow"/>
           </a:ln>
         </p:spPr>
@@ -4237,1578 +4232,6 @@
           </a:p>
         </p:txBody>
       </p:sp>
-      <p:grpSp>
-        <p:nvGrpSpPr>
-          <p:cNvPr id="129" name="Group 128"/>
-          <p:cNvGrpSpPr/>
-          <p:nvPr/>
-        </p:nvGrpSpPr>
-        <p:grpSpPr>
-          <a:xfrm>
-            <a:off x="2590800" y="1143000"/>
-            <a:ext cx="2286000" cy="536377"/>
-            <a:chOff x="2590800" y="1143000"/>
-            <a:chExt cx="2286000" cy="536377"/>
-          </a:xfrm>
-        </p:grpSpPr>
-        <p:grpSp>
-          <p:nvGrpSpPr>
-            <p:cNvPr id="122" name="Group 121"/>
-            <p:cNvGrpSpPr/>
-            <p:nvPr/>
-          </p:nvGrpSpPr>
-          <p:grpSpPr>
-            <a:xfrm>
-              <a:off x="2590800" y="1143000"/>
-              <a:ext cx="1219200" cy="533400"/>
-              <a:chOff x="2590800" y="2819400"/>
-              <a:chExt cx="1219200" cy="533400"/>
-            </a:xfrm>
-          </p:grpSpPr>
-          <p:sp>
-            <p:nvSpPr>
-              <p:cNvPr id="123" name="Rectangle 122"/>
-              <p:cNvSpPr/>
-              <p:nvPr/>
-            </p:nvSpPr>
-            <p:spPr>
-              <a:xfrm>
-                <a:off x="2590800" y="2819400"/>
-                <a:ext cx="1125415" cy="474658"/>
-              </a:xfrm>
-              <a:prstGeom prst="rect">
-                <a:avLst/>
-              </a:prstGeom>
-              <a:solidFill>
-                <a:schemeClr val="bg1">
-                  <a:lumMod val="95000"/>
-                </a:schemeClr>
-              </a:solidFill>
-            </p:spPr>
-            <p:style>
-              <a:lnRef idx="2">
-                <a:schemeClr val="accent1">
-                  <a:shade val="50000"/>
-                </a:schemeClr>
-              </a:lnRef>
-              <a:fillRef idx="1">
-                <a:schemeClr val="accent1"/>
-              </a:fillRef>
-              <a:effectRef idx="0">
-                <a:schemeClr val="accent1"/>
-              </a:effectRef>
-              <a:fontRef idx="minor">
-                <a:schemeClr val="lt1"/>
-              </a:fontRef>
-            </p:style>
-            <p:txBody>
-              <a:bodyPr rtlCol="0" anchor="ctr"/>
-              <a:lstStyle/>
-              <a:p>
-                <a:pPr algn="ctr"/>
-                <a:endParaRPr lang="en-US"/>
-              </a:p>
-            </p:txBody>
-          </p:sp>
-          <p:sp>
-            <p:nvSpPr>
-              <p:cNvPr id="124" name="TextBox 123"/>
-              <p:cNvSpPr txBox="1"/>
-              <p:nvPr/>
-            </p:nvSpPr>
-            <p:spPr>
-              <a:xfrm>
-                <a:off x="2590800" y="2887202"/>
-                <a:ext cx="1219200" cy="465598"/>
-              </a:xfrm>
-              <a:prstGeom prst="rect">
-                <a:avLst/>
-              </a:prstGeom>
-              <a:noFill/>
-            </p:spPr>
-            <p:txBody>
-              <a:bodyPr wrap="square" rtlCol="0">
-                <a:spAutoFit/>
-              </a:bodyPr>
-              <a:lstStyle/>
-              <a:p>
-                <a:r>
-                  <a:rPr lang="en-US" sz="1400" dirty="0" err="1" smtClean="0"/>
-                  <a:t>LocalizeUAV</a:t>
-                </a:r>
-                <a:endParaRPr lang="en-US" dirty="0" smtClean="0"/>
-              </a:p>
-            </p:txBody>
-          </p:sp>
-        </p:grpSp>
-        <p:cxnSp>
-          <p:nvCxnSpPr>
-            <p:cNvPr id="126" name="Straight Arrow Connector 125"/>
-            <p:cNvCxnSpPr>
-              <a:stCxn id="124" idx="3"/>
-            </p:cNvCxnSpPr>
-            <p:nvPr/>
-          </p:nvCxnSpPr>
-          <p:spPr>
-            <a:xfrm>
-              <a:off x="3810000" y="1443601"/>
-              <a:ext cx="1066800" cy="4199"/>
-            </a:xfrm>
-            <a:prstGeom prst="straightConnector1">
-              <a:avLst/>
-            </a:prstGeom>
-            <a:ln>
-              <a:tailEnd type="arrow"/>
-            </a:ln>
-          </p:spPr>
-          <p:style>
-            <a:lnRef idx="1">
-              <a:schemeClr val="accent1"/>
-            </a:lnRef>
-            <a:fillRef idx="0">
-              <a:schemeClr val="accent1"/>
-            </a:fillRef>
-            <a:effectRef idx="0">
-              <a:schemeClr val="accent1"/>
-            </a:effectRef>
-            <a:fontRef idx="minor">
-              <a:schemeClr val="tx1"/>
-            </a:fontRef>
-          </p:style>
-        </p:cxnSp>
-        <p:sp>
-          <p:nvSpPr>
-            <p:cNvPr id="128" name="TextBox 127"/>
-            <p:cNvSpPr txBox="1"/>
-            <p:nvPr/>
-          </p:nvSpPr>
-          <p:spPr>
-            <a:xfrm>
-              <a:off x="3962400" y="1371600"/>
-              <a:ext cx="914400" cy="307777"/>
-            </a:xfrm>
-            <a:prstGeom prst="rect">
-              <a:avLst/>
-            </a:prstGeom>
-            <a:noFill/>
-          </p:spPr>
-          <p:txBody>
-            <a:bodyPr wrap="square" rtlCol="0">
-              <a:spAutoFit/>
-            </a:bodyPr>
-            <a:lstStyle/>
-            <a:p>
-              <a:r>
-                <a:rPr lang="en-US" sz="1400" i="1" dirty="0" smtClean="0"/>
-                <a:t>Hallway</a:t>
-              </a:r>
-              <a:endParaRPr lang="en-US" sz="1400" i="1" dirty="0"/>
-            </a:p>
-          </p:txBody>
-        </p:sp>
-      </p:grpSp>
-      <p:grpSp>
-        <p:nvGrpSpPr>
-          <p:cNvPr id="130" name="Group 129"/>
-          <p:cNvGrpSpPr/>
-          <p:nvPr/>
-        </p:nvGrpSpPr>
-        <p:grpSpPr>
-          <a:xfrm>
-            <a:off x="2590800" y="2819400"/>
-            <a:ext cx="2286000" cy="536377"/>
-            <a:chOff x="2590800" y="1143000"/>
-            <a:chExt cx="2286000" cy="536377"/>
-          </a:xfrm>
-        </p:grpSpPr>
-        <p:grpSp>
-          <p:nvGrpSpPr>
-            <p:cNvPr id="131" name="Group 121"/>
-            <p:cNvGrpSpPr/>
-            <p:nvPr/>
-          </p:nvGrpSpPr>
-          <p:grpSpPr>
-            <a:xfrm>
-              <a:off x="2590800" y="1143000"/>
-              <a:ext cx="1219200" cy="533400"/>
-              <a:chOff x="2590800" y="2819400"/>
-              <a:chExt cx="1219200" cy="533400"/>
-            </a:xfrm>
-          </p:grpSpPr>
-          <p:sp>
-            <p:nvSpPr>
-              <p:cNvPr id="134" name="Rectangle 133"/>
-              <p:cNvSpPr/>
-              <p:nvPr/>
-            </p:nvSpPr>
-            <p:spPr>
-              <a:xfrm>
-                <a:off x="2590800" y="2819400"/>
-                <a:ext cx="1125415" cy="474658"/>
-              </a:xfrm>
-              <a:prstGeom prst="rect">
-                <a:avLst/>
-              </a:prstGeom>
-              <a:solidFill>
-                <a:schemeClr val="bg1">
-                  <a:lumMod val="95000"/>
-                </a:schemeClr>
-              </a:solidFill>
-            </p:spPr>
-            <p:style>
-              <a:lnRef idx="2">
-                <a:schemeClr val="accent1">
-                  <a:shade val="50000"/>
-                </a:schemeClr>
-              </a:lnRef>
-              <a:fillRef idx="1">
-                <a:schemeClr val="accent1"/>
-              </a:fillRef>
-              <a:effectRef idx="0">
-                <a:schemeClr val="accent1"/>
-              </a:effectRef>
-              <a:fontRef idx="minor">
-                <a:schemeClr val="lt1"/>
-              </a:fontRef>
-            </p:style>
-            <p:txBody>
-              <a:bodyPr rtlCol="0" anchor="ctr"/>
-              <a:lstStyle/>
-              <a:p>
-                <a:pPr algn="ctr"/>
-                <a:endParaRPr lang="en-US"/>
-              </a:p>
-            </p:txBody>
-          </p:sp>
-          <p:sp>
-            <p:nvSpPr>
-              <p:cNvPr id="135" name="TextBox 134"/>
-              <p:cNvSpPr txBox="1"/>
-              <p:nvPr/>
-            </p:nvSpPr>
-            <p:spPr>
-              <a:xfrm>
-                <a:off x="2590800" y="2887202"/>
-                <a:ext cx="1219200" cy="465598"/>
-              </a:xfrm>
-              <a:prstGeom prst="rect">
-                <a:avLst/>
-              </a:prstGeom>
-              <a:noFill/>
-            </p:spPr>
-            <p:txBody>
-              <a:bodyPr wrap="square" rtlCol="0">
-                <a:spAutoFit/>
-              </a:bodyPr>
-              <a:lstStyle/>
-              <a:p>
-                <a:r>
-                  <a:rPr lang="en-US" sz="1400" dirty="0" err="1" smtClean="0"/>
-                  <a:t>LocalizeUAV</a:t>
-                </a:r>
-                <a:endParaRPr lang="en-US" dirty="0" smtClean="0"/>
-              </a:p>
-            </p:txBody>
-          </p:sp>
-        </p:grpSp>
-        <p:cxnSp>
-          <p:nvCxnSpPr>
-            <p:cNvPr id="132" name="Straight Arrow Connector 131"/>
-            <p:cNvCxnSpPr>
-              <a:stCxn id="135" idx="3"/>
-            </p:cNvCxnSpPr>
-            <p:nvPr/>
-          </p:nvCxnSpPr>
-          <p:spPr>
-            <a:xfrm>
-              <a:off x="3810000" y="1443601"/>
-              <a:ext cx="1066800" cy="4199"/>
-            </a:xfrm>
-            <a:prstGeom prst="straightConnector1">
-              <a:avLst/>
-            </a:prstGeom>
-            <a:ln>
-              <a:tailEnd type="arrow"/>
-            </a:ln>
-          </p:spPr>
-          <p:style>
-            <a:lnRef idx="1">
-              <a:schemeClr val="accent1"/>
-            </a:lnRef>
-            <a:fillRef idx="0">
-              <a:schemeClr val="accent1"/>
-            </a:fillRef>
-            <a:effectRef idx="0">
-              <a:schemeClr val="accent1"/>
-            </a:effectRef>
-            <a:fontRef idx="minor">
-              <a:schemeClr val="tx1"/>
-            </a:fontRef>
-          </p:style>
-        </p:cxnSp>
-        <p:sp>
-          <p:nvSpPr>
-            <p:cNvPr id="133" name="TextBox 132"/>
-            <p:cNvSpPr txBox="1"/>
-            <p:nvPr/>
-          </p:nvSpPr>
-          <p:spPr>
-            <a:xfrm>
-              <a:off x="3962400" y="1371600"/>
-              <a:ext cx="914400" cy="307777"/>
-            </a:xfrm>
-            <a:prstGeom prst="rect">
-              <a:avLst/>
-            </a:prstGeom>
-            <a:noFill/>
-          </p:spPr>
-          <p:txBody>
-            <a:bodyPr wrap="square" rtlCol="0">
-              <a:spAutoFit/>
-            </a:bodyPr>
-            <a:lstStyle/>
-            <a:p>
-              <a:r>
-                <a:rPr lang="en-US" sz="1400" i="1" dirty="0" smtClean="0"/>
-                <a:t>Hallway</a:t>
-              </a:r>
-              <a:endParaRPr lang="en-US" sz="1400" i="1" dirty="0"/>
-            </a:p>
-          </p:txBody>
-        </p:sp>
-      </p:grpSp>
-      <p:grpSp>
-        <p:nvGrpSpPr>
-          <p:cNvPr id="136" name="Group 135"/>
-          <p:cNvGrpSpPr/>
-          <p:nvPr/>
-        </p:nvGrpSpPr>
-        <p:grpSpPr>
-          <a:xfrm>
-            <a:off x="2590800" y="4114800"/>
-            <a:ext cx="2286000" cy="536377"/>
-            <a:chOff x="2590800" y="1143000"/>
-            <a:chExt cx="2286000" cy="536377"/>
-          </a:xfrm>
-        </p:grpSpPr>
-        <p:grpSp>
-          <p:nvGrpSpPr>
-            <p:cNvPr id="137" name="Group 121"/>
-            <p:cNvGrpSpPr/>
-            <p:nvPr/>
-          </p:nvGrpSpPr>
-          <p:grpSpPr>
-            <a:xfrm>
-              <a:off x="2590800" y="1143000"/>
-              <a:ext cx="1219200" cy="533400"/>
-              <a:chOff x="2590800" y="2819400"/>
-              <a:chExt cx="1219200" cy="533400"/>
-            </a:xfrm>
-          </p:grpSpPr>
-          <p:sp>
-            <p:nvSpPr>
-              <p:cNvPr id="140" name="Rectangle 139"/>
-              <p:cNvSpPr/>
-              <p:nvPr/>
-            </p:nvSpPr>
-            <p:spPr>
-              <a:xfrm>
-                <a:off x="2590800" y="2819400"/>
-                <a:ext cx="1125415" cy="474658"/>
-              </a:xfrm>
-              <a:prstGeom prst="rect">
-                <a:avLst/>
-              </a:prstGeom>
-              <a:solidFill>
-                <a:schemeClr val="bg1">
-                  <a:lumMod val="95000"/>
-                </a:schemeClr>
-              </a:solidFill>
-            </p:spPr>
-            <p:style>
-              <a:lnRef idx="2">
-                <a:schemeClr val="accent1">
-                  <a:shade val="50000"/>
-                </a:schemeClr>
-              </a:lnRef>
-              <a:fillRef idx="1">
-                <a:schemeClr val="accent1"/>
-              </a:fillRef>
-              <a:effectRef idx="0">
-                <a:schemeClr val="accent1"/>
-              </a:effectRef>
-              <a:fontRef idx="minor">
-                <a:schemeClr val="lt1"/>
-              </a:fontRef>
-            </p:style>
-            <p:txBody>
-              <a:bodyPr rtlCol="0" anchor="ctr"/>
-              <a:lstStyle/>
-              <a:p>
-                <a:pPr algn="ctr"/>
-                <a:endParaRPr lang="en-US"/>
-              </a:p>
-            </p:txBody>
-          </p:sp>
-          <p:sp>
-            <p:nvSpPr>
-              <p:cNvPr id="141" name="TextBox 140"/>
-              <p:cNvSpPr txBox="1"/>
-              <p:nvPr/>
-            </p:nvSpPr>
-            <p:spPr>
-              <a:xfrm>
-                <a:off x="2590800" y="2887202"/>
-                <a:ext cx="1219200" cy="465598"/>
-              </a:xfrm>
-              <a:prstGeom prst="rect">
-                <a:avLst/>
-              </a:prstGeom>
-              <a:noFill/>
-            </p:spPr>
-            <p:txBody>
-              <a:bodyPr wrap="square" rtlCol="0">
-                <a:spAutoFit/>
-              </a:bodyPr>
-              <a:lstStyle/>
-              <a:p>
-                <a:r>
-                  <a:rPr lang="en-US" sz="1400" dirty="0" err="1" smtClean="0"/>
-                  <a:t>LocalizeUAV</a:t>
-                </a:r>
-                <a:endParaRPr lang="en-US" dirty="0" smtClean="0"/>
-              </a:p>
-            </p:txBody>
-          </p:sp>
-        </p:grpSp>
-        <p:cxnSp>
-          <p:nvCxnSpPr>
-            <p:cNvPr id="138" name="Straight Arrow Connector 137"/>
-            <p:cNvCxnSpPr>
-              <a:stCxn id="141" idx="3"/>
-            </p:cNvCxnSpPr>
-            <p:nvPr/>
-          </p:nvCxnSpPr>
-          <p:spPr>
-            <a:xfrm>
-              <a:off x="3810000" y="1443601"/>
-              <a:ext cx="1066800" cy="4199"/>
-            </a:xfrm>
-            <a:prstGeom prst="straightConnector1">
-              <a:avLst/>
-            </a:prstGeom>
-            <a:ln>
-              <a:tailEnd type="arrow"/>
-            </a:ln>
-          </p:spPr>
-          <p:style>
-            <a:lnRef idx="1">
-              <a:schemeClr val="accent1"/>
-            </a:lnRef>
-            <a:fillRef idx="0">
-              <a:schemeClr val="accent1"/>
-            </a:fillRef>
-            <a:effectRef idx="0">
-              <a:schemeClr val="accent1"/>
-            </a:effectRef>
-            <a:fontRef idx="minor">
-              <a:schemeClr val="tx1"/>
-            </a:fontRef>
-          </p:style>
-        </p:cxnSp>
-        <p:sp>
-          <p:nvSpPr>
-            <p:cNvPr id="139" name="TextBox 138"/>
-            <p:cNvSpPr txBox="1"/>
-            <p:nvPr/>
-          </p:nvSpPr>
-          <p:spPr>
-            <a:xfrm>
-              <a:off x="3962400" y="1371600"/>
-              <a:ext cx="914400" cy="307777"/>
-            </a:xfrm>
-            <a:prstGeom prst="rect">
-              <a:avLst/>
-            </a:prstGeom>
-            <a:noFill/>
-          </p:spPr>
-          <p:txBody>
-            <a:bodyPr wrap="square" rtlCol="0">
-              <a:spAutoFit/>
-            </a:bodyPr>
-            <a:lstStyle/>
-            <a:p>
-              <a:r>
-                <a:rPr lang="en-US" sz="1400" i="1" dirty="0" smtClean="0"/>
-                <a:t>Hallway</a:t>
-              </a:r>
-              <a:endParaRPr lang="en-US" sz="1400" i="1" dirty="0"/>
-            </a:p>
-          </p:txBody>
-        </p:sp>
-      </p:grpSp>
-      <p:grpSp>
-        <p:nvGrpSpPr>
-          <p:cNvPr id="147" name="Group 121"/>
-          <p:cNvGrpSpPr/>
-          <p:nvPr/>
-        </p:nvGrpSpPr>
-        <p:grpSpPr>
-          <a:xfrm>
-            <a:off x="2590800" y="6172200"/>
-            <a:ext cx="1219200" cy="533400"/>
-            <a:chOff x="2590800" y="2819400"/>
-            <a:chExt cx="1219200" cy="533400"/>
-          </a:xfrm>
-        </p:grpSpPr>
-        <p:sp>
-          <p:nvSpPr>
-            <p:cNvPr id="150" name="Rectangle 149"/>
-            <p:cNvSpPr/>
-            <p:nvPr/>
-          </p:nvSpPr>
-          <p:spPr>
-            <a:xfrm>
-              <a:off x="2590800" y="2819400"/>
-              <a:ext cx="1125415" cy="474658"/>
-            </a:xfrm>
-            <a:prstGeom prst="rect">
-              <a:avLst/>
-            </a:prstGeom>
-            <a:solidFill>
-              <a:schemeClr val="bg1">
-                <a:lumMod val="95000"/>
-              </a:schemeClr>
-            </a:solidFill>
-          </p:spPr>
-          <p:style>
-            <a:lnRef idx="2">
-              <a:schemeClr val="accent1">
-                <a:shade val="50000"/>
-              </a:schemeClr>
-            </a:lnRef>
-            <a:fillRef idx="1">
-              <a:schemeClr val="accent1"/>
-            </a:fillRef>
-            <a:effectRef idx="0">
-              <a:schemeClr val="accent1"/>
-            </a:effectRef>
-            <a:fontRef idx="minor">
-              <a:schemeClr val="lt1"/>
-            </a:fontRef>
-          </p:style>
-          <p:txBody>
-            <a:bodyPr rtlCol="0" anchor="ctr"/>
-            <a:lstStyle/>
-            <a:p>
-              <a:pPr algn="ctr"/>
-              <a:endParaRPr lang="en-US"/>
-            </a:p>
-          </p:txBody>
-        </p:sp>
-        <p:sp>
-          <p:nvSpPr>
-            <p:cNvPr id="151" name="TextBox 150"/>
-            <p:cNvSpPr txBox="1"/>
-            <p:nvPr/>
-          </p:nvSpPr>
-          <p:spPr>
-            <a:xfrm>
-              <a:off x="2590800" y="2887202"/>
-              <a:ext cx="1219200" cy="465598"/>
-            </a:xfrm>
-            <a:prstGeom prst="rect">
-              <a:avLst/>
-            </a:prstGeom>
-            <a:noFill/>
-          </p:spPr>
-          <p:txBody>
-            <a:bodyPr wrap="square" rtlCol="0">
-              <a:spAutoFit/>
-            </a:bodyPr>
-            <a:lstStyle/>
-            <a:p>
-              <a:r>
-                <a:rPr lang="en-US" sz="1400" dirty="0" err="1" smtClean="0"/>
-                <a:t>LocalizeUAV</a:t>
-              </a:r>
-              <a:endParaRPr lang="en-US" dirty="0" smtClean="0"/>
-            </a:p>
-          </p:txBody>
-        </p:sp>
-      </p:grpSp>
-      <p:cxnSp>
-        <p:nvCxnSpPr>
-          <p:cNvPr id="148" name="Straight Arrow Connector 147"/>
-          <p:cNvCxnSpPr>
-            <a:stCxn id="151" idx="3"/>
-          </p:cNvCxnSpPr>
-          <p:nvPr/>
-        </p:nvCxnSpPr>
-        <p:spPr>
-          <a:xfrm>
-            <a:off x="3810000" y="6472801"/>
-            <a:ext cx="1066800" cy="4199"/>
-          </a:xfrm>
-          <a:prstGeom prst="straightConnector1">
-            <a:avLst/>
-          </a:prstGeom>
-          <a:ln>
-            <a:tailEnd type="arrow"/>
-          </a:ln>
-        </p:spPr>
-        <p:style>
-          <a:lnRef idx="1">
-            <a:schemeClr val="accent1"/>
-          </a:lnRef>
-          <a:fillRef idx="0">
-            <a:schemeClr val="accent1"/>
-          </a:fillRef>
-          <a:effectRef idx="0">
-            <a:schemeClr val="accent1"/>
-          </a:effectRef>
-          <a:fontRef idx="minor">
-            <a:schemeClr val="tx1"/>
-          </a:fontRef>
-        </p:style>
-      </p:cxnSp>
-      <p:sp>
-        <p:nvSpPr>
-          <p:cNvPr id="149" name="TextBox 148"/>
-          <p:cNvSpPr txBox="1"/>
-          <p:nvPr/>
-        </p:nvSpPr>
-        <p:spPr>
-          <a:xfrm>
-            <a:off x="3962400" y="6400800"/>
-            <a:ext cx="914400" cy="307777"/>
-          </a:xfrm>
-          <a:prstGeom prst="rect">
-            <a:avLst/>
-          </a:prstGeom>
-          <a:noFill/>
-        </p:spPr>
-        <p:txBody>
-          <a:bodyPr wrap="square" rtlCol="0">
-            <a:spAutoFit/>
-          </a:bodyPr>
-          <a:lstStyle/>
-          <a:p>
-            <a:r>
-              <a:rPr lang="en-US" sz="1400" i="1" dirty="0" smtClean="0"/>
-              <a:t>Hallway</a:t>
-            </a:r>
-            <a:endParaRPr lang="en-US" sz="1400" i="1" dirty="0"/>
-          </a:p>
-        </p:txBody>
-      </p:sp>
-      <p:grpSp>
-        <p:nvGrpSpPr>
-          <p:cNvPr id="167" name="Group 166"/>
-          <p:cNvGrpSpPr/>
-          <p:nvPr/>
-        </p:nvGrpSpPr>
-        <p:grpSpPr>
-          <a:xfrm>
-            <a:off x="2590800" y="533400"/>
-            <a:ext cx="2590800" cy="474658"/>
-            <a:chOff x="2590800" y="5562600"/>
-            <a:chExt cx="2590800" cy="474658"/>
-          </a:xfrm>
-        </p:grpSpPr>
-        <p:sp>
-          <p:nvSpPr>
-            <p:cNvPr id="168" name="Rectangle 167"/>
-            <p:cNvSpPr/>
-            <p:nvPr/>
-          </p:nvSpPr>
-          <p:spPr>
-            <a:xfrm>
-              <a:off x="2590800" y="5562600"/>
-              <a:ext cx="1125415" cy="474658"/>
-            </a:xfrm>
-            <a:prstGeom prst="rect">
-              <a:avLst/>
-            </a:prstGeom>
-            <a:solidFill>
-              <a:schemeClr val="bg1">
-                <a:lumMod val="95000"/>
-              </a:schemeClr>
-            </a:solidFill>
-          </p:spPr>
-          <p:style>
-            <a:lnRef idx="2">
-              <a:schemeClr val="accent1">
-                <a:shade val="50000"/>
-              </a:schemeClr>
-            </a:lnRef>
-            <a:fillRef idx="1">
-              <a:schemeClr val="accent1"/>
-            </a:fillRef>
-            <a:effectRef idx="0">
-              <a:schemeClr val="accent1"/>
-            </a:effectRef>
-            <a:fontRef idx="minor">
-              <a:schemeClr val="lt1"/>
-            </a:fontRef>
-          </p:style>
-          <p:txBody>
-            <a:bodyPr rtlCol="0" anchor="ctr"/>
-            <a:lstStyle/>
-            <a:p>
-              <a:pPr algn="ctr"/>
-              <a:endParaRPr lang="en-US"/>
-            </a:p>
-          </p:txBody>
-        </p:sp>
-        <p:sp>
-          <p:nvSpPr>
-            <p:cNvPr id="169" name="TextBox 168"/>
-            <p:cNvSpPr txBox="1"/>
-            <p:nvPr/>
-          </p:nvSpPr>
-          <p:spPr>
-            <a:xfrm>
-              <a:off x="2590800" y="5638800"/>
-              <a:ext cx="1219200" cy="307777"/>
-            </a:xfrm>
-            <a:prstGeom prst="rect">
-              <a:avLst/>
-            </a:prstGeom>
-            <a:noFill/>
-          </p:spPr>
-          <p:txBody>
-            <a:bodyPr wrap="square" rtlCol="0">
-              <a:spAutoFit/>
-            </a:bodyPr>
-            <a:lstStyle/>
-            <a:p>
-              <a:r>
-                <a:rPr lang="en-US" sz="1400" dirty="0" smtClean="0"/>
-                <a:t>See Crowds</a:t>
-              </a:r>
-              <a:endParaRPr lang="en-US" dirty="0" smtClean="0"/>
-            </a:p>
-          </p:txBody>
-        </p:sp>
-        <p:cxnSp>
-          <p:nvCxnSpPr>
-            <p:cNvPr id="170" name="Straight Arrow Connector 169"/>
-            <p:cNvCxnSpPr/>
-            <p:nvPr/>
-          </p:nvCxnSpPr>
-          <p:spPr>
-            <a:xfrm>
-              <a:off x="3810000" y="5787001"/>
-              <a:ext cx="1066800" cy="4199"/>
-            </a:xfrm>
-            <a:prstGeom prst="straightConnector1">
-              <a:avLst/>
-            </a:prstGeom>
-            <a:ln>
-              <a:tailEnd type="arrow"/>
-            </a:ln>
-          </p:spPr>
-          <p:style>
-            <a:lnRef idx="1">
-              <a:schemeClr val="accent1"/>
-            </a:lnRef>
-            <a:fillRef idx="0">
-              <a:schemeClr val="accent1"/>
-            </a:fillRef>
-            <a:effectRef idx="0">
-              <a:schemeClr val="accent1"/>
-            </a:effectRef>
-            <a:fontRef idx="minor">
-              <a:schemeClr val="tx1"/>
-            </a:fontRef>
-          </p:style>
-        </p:cxnSp>
-        <p:sp>
-          <p:nvSpPr>
-            <p:cNvPr id="171" name="TextBox 170"/>
-            <p:cNvSpPr txBox="1"/>
-            <p:nvPr/>
-          </p:nvSpPr>
-          <p:spPr>
-            <a:xfrm>
-              <a:off x="3733800" y="5562600"/>
-              <a:ext cx="1447800" cy="461665"/>
-            </a:xfrm>
-            <a:prstGeom prst="rect">
-              <a:avLst/>
-            </a:prstGeom>
-            <a:noFill/>
-          </p:spPr>
-          <p:txBody>
-            <a:bodyPr wrap="square" rtlCol="0">
-              <a:spAutoFit/>
-            </a:bodyPr>
-            <a:lstStyle/>
-            <a:p>
-              <a:r>
-                <a:rPr lang="en-US" sz="1200" i="1" dirty="0" smtClean="0"/>
-                <a:t>Crowd Locations</a:t>
-              </a:r>
-              <a:endParaRPr lang="en-US" sz="1400" i="1" dirty="0" smtClean="0"/>
-            </a:p>
-            <a:p>
-              <a:r>
-                <a:rPr lang="en-US" sz="1200" i="1" dirty="0" smtClean="0"/>
-                <a:t>(</a:t>
-              </a:r>
-              <a:r>
-                <a:rPr lang="en-US" sz="1200" i="1" dirty="0" err="1" smtClean="0"/>
-                <a:t>blockableCrowds</a:t>
-              </a:r>
-              <a:r>
-                <a:rPr lang="en-US" sz="1200" i="1" dirty="0" smtClean="0"/>
-                <a:t>)</a:t>
-              </a:r>
-              <a:endParaRPr lang="en-US" sz="1400" i="1" dirty="0"/>
-            </a:p>
-          </p:txBody>
-        </p:sp>
-      </p:grpSp>
-      <p:cxnSp>
-        <p:nvCxnSpPr>
-          <p:cNvPr id="173" name="Elbow Connector 172"/>
-          <p:cNvCxnSpPr>
-            <a:stCxn id="14" idx="3"/>
-            <a:endCxn id="124" idx="1"/>
-          </p:cNvCxnSpPr>
-          <p:nvPr/>
-        </p:nvCxnSpPr>
-        <p:spPr>
-          <a:xfrm flipV="1">
-            <a:off x="914400" y="1443601"/>
-            <a:ext cx="1676400" cy="3236865"/>
-          </a:xfrm>
-          <a:prstGeom prst="bentConnector3">
-            <a:avLst>
-              <a:gd name="adj1" fmla="val 69008"/>
-            </a:avLst>
-          </a:prstGeom>
-          <a:ln>
-            <a:solidFill>
-              <a:schemeClr val="accent2"/>
-            </a:solidFill>
-            <a:tailEnd type="arrow"/>
-          </a:ln>
-        </p:spPr>
-        <p:style>
-          <a:lnRef idx="1">
-            <a:schemeClr val="accent1"/>
-          </a:lnRef>
-          <a:fillRef idx="0">
-            <a:schemeClr val="accent1"/>
-          </a:fillRef>
-          <a:effectRef idx="0">
-            <a:schemeClr val="accent1"/>
-          </a:effectRef>
-          <a:fontRef idx="minor">
-            <a:schemeClr val="tx1"/>
-          </a:fontRef>
-        </p:style>
-      </p:cxnSp>
-      <p:grpSp>
-        <p:nvGrpSpPr>
-          <p:cNvPr id="205" name="Group 204"/>
-          <p:cNvGrpSpPr/>
-          <p:nvPr/>
-        </p:nvGrpSpPr>
-        <p:grpSpPr>
-          <a:xfrm>
-            <a:off x="2057400" y="2971800"/>
-            <a:ext cx="533400" cy="3509400"/>
-            <a:chOff x="1752600" y="2971800"/>
-            <a:chExt cx="838200" cy="3509400"/>
-          </a:xfrm>
-        </p:grpSpPr>
-        <p:cxnSp>
-          <p:nvCxnSpPr>
-            <p:cNvPr id="196" name="Straight Arrow Connector 195"/>
-            <p:cNvCxnSpPr>
-              <a:endCxn id="135" idx="1"/>
-            </p:cNvCxnSpPr>
-            <p:nvPr/>
-          </p:nvCxnSpPr>
-          <p:spPr>
-            <a:xfrm flipV="1">
-              <a:off x="1752600" y="3120001"/>
-              <a:ext cx="838200" cy="4199"/>
-            </a:xfrm>
-            <a:prstGeom prst="straightConnector1">
-              <a:avLst/>
-            </a:prstGeom>
-            <a:ln>
-              <a:solidFill>
-                <a:schemeClr val="accent2"/>
-              </a:solidFill>
-              <a:tailEnd type="arrow"/>
-            </a:ln>
-          </p:spPr>
-          <p:style>
-            <a:lnRef idx="1">
-              <a:schemeClr val="accent1"/>
-            </a:lnRef>
-            <a:fillRef idx="0">
-              <a:schemeClr val="accent1"/>
-            </a:fillRef>
-            <a:effectRef idx="0">
-              <a:schemeClr val="accent1"/>
-            </a:effectRef>
-            <a:fontRef idx="minor">
-              <a:schemeClr val="tx1"/>
-            </a:fontRef>
-          </p:style>
-        </p:cxnSp>
-        <p:cxnSp>
-          <p:nvCxnSpPr>
-            <p:cNvPr id="198" name="Straight Arrow Connector 197"/>
-            <p:cNvCxnSpPr/>
-            <p:nvPr/>
-          </p:nvCxnSpPr>
-          <p:spPr>
-            <a:xfrm flipV="1">
-              <a:off x="1752600" y="4343400"/>
-              <a:ext cx="838200" cy="4200"/>
-            </a:xfrm>
-            <a:prstGeom prst="straightConnector1">
-              <a:avLst/>
-            </a:prstGeom>
-            <a:ln>
-              <a:solidFill>
-                <a:schemeClr val="accent2"/>
-              </a:solidFill>
-              <a:tailEnd type="arrow"/>
-            </a:ln>
-          </p:spPr>
-          <p:style>
-            <a:lnRef idx="1">
-              <a:schemeClr val="accent1"/>
-            </a:lnRef>
-            <a:fillRef idx="0">
-              <a:schemeClr val="accent1"/>
-            </a:fillRef>
-            <a:effectRef idx="0">
-              <a:schemeClr val="accent1"/>
-            </a:effectRef>
-            <a:fontRef idx="minor">
-              <a:schemeClr val="tx1"/>
-            </a:fontRef>
-          </p:style>
-        </p:cxnSp>
-        <p:cxnSp>
-          <p:nvCxnSpPr>
-            <p:cNvPr id="199" name="Straight Arrow Connector 198"/>
-            <p:cNvCxnSpPr/>
-            <p:nvPr/>
-          </p:nvCxnSpPr>
-          <p:spPr>
-            <a:xfrm flipV="1">
-              <a:off x="1752600" y="6477000"/>
-              <a:ext cx="838200" cy="4200"/>
-            </a:xfrm>
-            <a:prstGeom prst="straightConnector1">
-              <a:avLst/>
-            </a:prstGeom>
-            <a:ln>
-              <a:solidFill>
-                <a:schemeClr val="accent2"/>
-              </a:solidFill>
-              <a:tailEnd type="arrow"/>
-            </a:ln>
-          </p:spPr>
-          <p:style>
-            <a:lnRef idx="1">
-              <a:schemeClr val="accent1"/>
-            </a:lnRef>
-            <a:fillRef idx="0">
-              <a:schemeClr val="accent1"/>
-            </a:fillRef>
-            <a:effectRef idx="0">
-              <a:schemeClr val="accent1"/>
-            </a:effectRef>
-            <a:fontRef idx="minor">
-              <a:schemeClr val="tx1"/>
-            </a:fontRef>
-          </p:style>
-        </p:cxnSp>
-        <p:cxnSp>
-          <p:nvCxnSpPr>
-            <p:cNvPr id="201" name="Straight Connector 200"/>
-            <p:cNvCxnSpPr/>
-            <p:nvPr/>
-          </p:nvCxnSpPr>
-          <p:spPr>
-            <a:xfrm>
-              <a:off x="1752600" y="2971800"/>
-              <a:ext cx="0" cy="3505200"/>
-            </a:xfrm>
-            <a:prstGeom prst="line">
-              <a:avLst/>
-            </a:prstGeom>
-            <a:ln>
-              <a:solidFill>
-                <a:schemeClr val="accent2"/>
-              </a:solidFill>
-            </a:ln>
-          </p:spPr>
-          <p:style>
-            <a:lnRef idx="1">
-              <a:schemeClr val="accent1"/>
-            </a:lnRef>
-            <a:fillRef idx="0">
-              <a:schemeClr val="accent1"/>
-            </a:fillRef>
-            <a:effectRef idx="0">
-              <a:schemeClr val="accent1"/>
-            </a:effectRef>
-            <a:fontRef idx="minor">
-              <a:schemeClr val="tx1"/>
-            </a:fontRef>
-          </p:style>
-        </p:cxnSp>
-      </p:grpSp>
-      <p:cxnSp>
-        <p:nvCxnSpPr>
-          <p:cNvPr id="209" name="Elbow Connector 208"/>
-          <p:cNvCxnSpPr>
-            <a:stCxn id="16" idx="3"/>
-            <a:endCxn id="169" idx="1"/>
-          </p:cNvCxnSpPr>
-          <p:nvPr/>
-        </p:nvCxnSpPr>
-        <p:spPr>
-          <a:xfrm flipV="1">
-            <a:off x="914400" y="763489"/>
-            <a:ext cx="1676400" cy="411777"/>
-          </a:xfrm>
-          <a:prstGeom prst="bentConnector3">
-            <a:avLst>
-              <a:gd name="adj1" fmla="val 17769"/>
-            </a:avLst>
-          </a:prstGeom>
-          <a:ln>
-            <a:solidFill>
-              <a:schemeClr val="accent1"/>
-            </a:solidFill>
-            <a:tailEnd type="arrow"/>
-          </a:ln>
-        </p:spPr>
-        <p:style>
-          <a:lnRef idx="1">
-            <a:schemeClr val="accent1"/>
-          </a:lnRef>
-          <a:fillRef idx="0">
-            <a:schemeClr val="accent1"/>
-          </a:fillRef>
-          <a:effectRef idx="0">
-            <a:schemeClr val="accent1"/>
-          </a:effectRef>
-          <a:fontRef idx="minor">
-            <a:schemeClr val="tx1"/>
-          </a:fontRef>
-        </p:style>
-      </p:cxnSp>
-      <p:cxnSp>
-        <p:nvCxnSpPr>
-          <p:cNvPr id="212" name="Straight Arrow Connector 211"/>
-          <p:cNvCxnSpPr>
-            <a:endCxn id="164" idx="1"/>
-          </p:cNvCxnSpPr>
-          <p:nvPr/>
-        </p:nvCxnSpPr>
-        <p:spPr>
-          <a:xfrm>
-            <a:off x="1219200" y="2438400"/>
-            <a:ext cx="1371600" cy="1489"/>
-          </a:xfrm>
-          <a:prstGeom prst="straightConnector1">
-            <a:avLst/>
-          </a:prstGeom>
-          <a:ln>
-            <a:tailEnd type="arrow"/>
-          </a:ln>
-        </p:spPr>
-        <p:style>
-          <a:lnRef idx="1">
-            <a:schemeClr val="accent1"/>
-          </a:lnRef>
-          <a:fillRef idx="0">
-            <a:schemeClr val="accent1"/>
-          </a:fillRef>
-          <a:effectRef idx="0">
-            <a:schemeClr val="accent1"/>
-          </a:effectRef>
-          <a:fontRef idx="minor">
-            <a:schemeClr val="tx1"/>
-          </a:fontRef>
-        </p:style>
-      </p:cxnSp>
-      <p:cxnSp>
-        <p:nvCxnSpPr>
-          <p:cNvPr id="215" name="Straight Arrow Connector 214"/>
-          <p:cNvCxnSpPr/>
-          <p:nvPr/>
-        </p:nvCxnSpPr>
-        <p:spPr>
-          <a:xfrm>
-            <a:off x="1219200" y="5791200"/>
-            <a:ext cx="1371600" cy="1489"/>
-          </a:xfrm>
-          <a:prstGeom prst="straightConnector1">
-            <a:avLst/>
-          </a:prstGeom>
-          <a:ln>
-            <a:tailEnd type="arrow"/>
-          </a:ln>
-        </p:spPr>
-        <p:style>
-          <a:lnRef idx="1">
-            <a:schemeClr val="accent1"/>
-          </a:lnRef>
-          <a:fillRef idx="0">
-            <a:schemeClr val="accent1"/>
-          </a:fillRef>
-          <a:effectRef idx="0">
-            <a:schemeClr val="accent1"/>
-          </a:effectRef>
-          <a:fontRef idx="minor">
-            <a:schemeClr val="tx1"/>
-          </a:fontRef>
-        </p:style>
-      </p:cxnSp>
-      <p:cxnSp>
-        <p:nvCxnSpPr>
-          <p:cNvPr id="217" name="Straight Connector 216"/>
-          <p:cNvCxnSpPr/>
-          <p:nvPr/>
-        </p:nvCxnSpPr>
-        <p:spPr>
-          <a:xfrm flipV="1">
-            <a:off x="1219200" y="1066800"/>
-            <a:ext cx="0" cy="4724400"/>
-          </a:xfrm>
-          <a:prstGeom prst="line">
-            <a:avLst/>
-          </a:prstGeom>
-        </p:spPr>
-        <p:style>
-          <a:lnRef idx="1">
-            <a:schemeClr val="accent1"/>
-          </a:lnRef>
-          <a:fillRef idx="0">
-            <a:schemeClr val="accent1"/>
-          </a:fillRef>
-          <a:effectRef idx="0">
-            <a:schemeClr val="accent1"/>
-          </a:effectRef>
-          <a:fontRef idx="minor">
-            <a:schemeClr val="tx1"/>
-          </a:fontRef>
-        </p:style>
-      </p:cxnSp>
-      <p:sp>
-        <p:nvSpPr>
-          <p:cNvPr id="230" name="TextBox 229"/>
-          <p:cNvSpPr txBox="1"/>
-          <p:nvPr/>
-        </p:nvSpPr>
-        <p:spPr>
-          <a:xfrm>
-            <a:off x="1371600" y="4419600"/>
-            <a:ext cx="762000" cy="523220"/>
-          </a:xfrm>
-          <a:prstGeom prst="rect">
-            <a:avLst/>
-          </a:prstGeom>
-          <a:noFill/>
-        </p:spPr>
-        <p:txBody>
-          <a:bodyPr wrap="square" rtlCol="0">
-            <a:spAutoFit/>
-          </a:bodyPr>
-          <a:lstStyle/>
-          <a:p>
-            <a:r>
-              <a:rPr lang="en-US" sz="1400" i="1" dirty="0"/>
-              <a:t>p</a:t>
-            </a:r>
-            <a:r>
-              <a:rPr lang="en-US" sz="1400" i="1" dirty="0" smtClean="0"/>
-              <a:t>oint cloud</a:t>
-            </a:r>
-            <a:endParaRPr lang="en-US" sz="1400" i="1" dirty="0"/>
-          </a:p>
-        </p:txBody>
-      </p:sp>
-      <p:sp>
-        <p:nvSpPr>
-          <p:cNvPr id="232" name="TextBox 231"/>
-          <p:cNvSpPr txBox="1"/>
-          <p:nvPr/>
-        </p:nvSpPr>
-        <p:spPr>
-          <a:xfrm>
-            <a:off x="1219200" y="457200"/>
-            <a:ext cx="762000" cy="646331"/>
-          </a:xfrm>
-          <a:prstGeom prst="rect">
-            <a:avLst/>
-          </a:prstGeom>
-          <a:noFill/>
-        </p:spPr>
-        <p:txBody>
-          <a:bodyPr wrap="square" rtlCol="0">
-            <a:spAutoFit/>
-          </a:bodyPr>
-          <a:lstStyle/>
-          <a:p>
-            <a:endParaRPr lang="en-US" dirty="0" smtClean="0"/>
-          </a:p>
-          <a:p>
-            <a:endParaRPr lang="en-US" dirty="0"/>
-          </a:p>
-        </p:txBody>
-      </p:sp>
-      <p:grpSp>
-        <p:nvGrpSpPr>
-          <p:cNvPr id="235" name="Group 234"/>
-          <p:cNvGrpSpPr/>
-          <p:nvPr/>
-        </p:nvGrpSpPr>
-        <p:grpSpPr>
-          <a:xfrm>
-            <a:off x="2590800" y="2209800"/>
-            <a:ext cx="2590800" cy="474658"/>
-            <a:chOff x="2590800" y="5562600"/>
-            <a:chExt cx="2590800" cy="474658"/>
-          </a:xfrm>
-        </p:grpSpPr>
-        <p:sp>
-          <p:nvSpPr>
-            <p:cNvPr id="236" name="Rectangle 235"/>
-            <p:cNvSpPr/>
-            <p:nvPr/>
-          </p:nvSpPr>
-          <p:spPr>
-            <a:xfrm>
-              <a:off x="2590800" y="5562600"/>
-              <a:ext cx="1125415" cy="474658"/>
-            </a:xfrm>
-            <a:prstGeom prst="rect">
-              <a:avLst/>
-            </a:prstGeom>
-            <a:solidFill>
-              <a:schemeClr val="bg1">
-                <a:lumMod val="95000"/>
-              </a:schemeClr>
-            </a:solidFill>
-          </p:spPr>
-          <p:style>
-            <a:lnRef idx="2">
-              <a:schemeClr val="accent1">
-                <a:shade val="50000"/>
-              </a:schemeClr>
-            </a:lnRef>
-            <a:fillRef idx="1">
-              <a:schemeClr val="accent1"/>
-            </a:fillRef>
-            <a:effectRef idx="0">
-              <a:schemeClr val="accent1"/>
-            </a:effectRef>
-            <a:fontRef idx="minor">
-              <a:schemeClr val="lt1"/>
-            </a:fontRef>
-          </p:style>
-          <p:txBody>
-            <a:bodyPr rtlCol="0" anchor="ctr"/>
-            <a:lstStyle/>
-            <a:p>
-              <a:pPr algn="ctr"/>
-              <a:endParaRPr lang="en-US"/>
-            </a:p>
-          </p:txBody>
-        </p:sp>
-        <p:sp>
-          <p:nvSpPr>
-            <p:cNvPr id="237" name="TextBox 236"/>
-            <p:cNvSpPr txBox="1"/>
-            <p:nvPr/>
-          </p:nvSpPr>
-          <p:spPr>
-            <a:xfrm>
-              <a:off x="2590800" y="5638800"/>
-              <a:ext cx="1219200" cy="307777"/>
-            </a:xfrm>
-            <a:prstGeom prst="rect">
-              <a:avLst/>
-            </a:prstGeom>
-            <a:noFill/>
-          </p:spPr>
-          <p:txBody>
-            <a:bodyPr wrap="square" rtlCol="0">
-              <a:spAutoFit/>
-            </a:bodyPr>
-            <a:lstStyle/>
-            <a:p>
-              <a:r>
-                <a:rPr lang="en-US" sz="1400" dirty="0" smtClean="0"/>
-                <a:t>See Crowds</a:t>
-              </a:r>
-              <a:endParaRPr lang="en-US" dirty="0" smtClean="0"/>
-            </a:p>
-          </p:txBody>
-        </p:sp>
-        <p:cxnSp>
-          <p:nvCxnSpPr>
-            <p:cNvPr id="238" name="Straight Arrow Connector 237"/>
-            <p:cNvCxnSpPr/>
-            <p:nvPr/>
-          </p:nvCxnSpPr>
-          <p:spPr>
-            <a:xfrm>
-              <a:off x="3810000" y="5787001"/>
-              <a:ext cx="1066800" cy="4199"/>
-            </a:xfrm>
-            <a:prstGeom prst="straightConnector1">
-              <a:avLst/>
-            </a:prstGeom>
-            <a:ln>
-              <a:tailEnd type="arrow"/>
-            </a:ln>
-          </p:spPr>
-          <p:style>
-            <a:lnRef idx="1">
-              <a:schemeClr val="accent1"/>
-            </a:lnRef>
-            <a:fillRef idx="0">
-              <a:schemeClr val="accent1"/>
-            </a:fillRef>
-            <a:effectRef idx="0">
-              <a:schemeClr val="accent1"/>
-            </a:effectRef>
-            <a:fontRef idx="minor">
-              <a:schemeClr val="tx1"/>
-            </a:fontRef>
-          </p:style>
-        </p:cxnSp>
-        <p:sp>
-          <p:nvSpPr>
-            <p:cNvPr id="239" name="TextBox 238"/>
-            <p:cNvSpPr txBox="1"/>
-            <p:nvPr/>
-          </p:nvSpPr>
-          <p:spPr>
-            <a:xfrm>
-              <a:off x="3733800" y="5562600"/>
-              <a:ext cx="1447800" cy="461665"/>
-            </a:xfrm>
-            <a:prstGeom prst="rect">
-              <a:avLst/>
-            </a:prstGeom>
-            <a:noFill/>
-          </p:spPr>
-          <p:txBody>
-            <a:bodyPr wrap="square" rtlCol="0">
-              <a:spAutoFit/>
-            </a:bodyPr>
-            <a:lstStyle/>
-            <a:p>
-              <a:r>
-                <a:rPr lang="en-US" sz="1200" i="1" dirty="0" smtClean="0"/>
-                <a:t>Crowd Locations</a:t>
-              </a:r>
-              <a:endParaRPr lang="en-US" sz="1400" i="1" dirty="0" smtClean="0"/>
-            </a:p>
-            <a:p>
-              <a:r>
-                <a:rPr lang="en-US" sz="1200" i="1" dirty="0" smtClean="0"/>
-                <a:t>(</a:t>
-              </a:r>
-              <a:r>
-                <a:rPr lang="en-US" sz="1200" i="1" dirty="0" err="1" smtClean="0"/>
-                <a:t>blockableCrowds</a:t>
-              </a:r>
-              <a:r>
-                <a:rPr lang="en-US" sz="1200" i="1" dirty="0" smtClean="0"/>
-                <a:t>)</a:t>
-              </a:r>
-              <a:endParaRPr lang="en-US" sz="1400" i="1" dirty="0"/>
-            </a:p>
-          </p:txBody>
-        </p:sp>
-      </p:grpSp>
-      <p:grpSp>
-        <p:nvGrpSpPr>
-          <p:cNvPr id="240" name="Group 239"/>
-          <p:cNvGrpSpPr/>
-          <p:nvPr/>
-        </p:nvGrpSpPr>
-        <p:grpSpPr>
-          <a:xfrm>
-            <a:off x="2590800" y="5562600"/>
-            <a:ext cx="2590800" cy="474658"/>
-            <a:chOff x="2590800" y="5562600"/>
-            <a:chExt cx="2590800" cy="474658"/>
-          </a:xfrm>
-        </p:grpSpPr>
-        <p:sp>
-          <p:nvSpPr>
-            <p:cNvPr id="241" name="Rectangle 240"/>
-            <p:cNvSpPr/>
-            <p:nvPr/>
-          </p:nvSpPr>
-          <p:spPr>
-            <a:xfrm>
-              <a:off x="2590800" y="5562600"/>
-              <a:ext cx="1125415" cy="474658"/>
-            </a:xfrm>
-            <a:prstGeom prst="rect">
-              <a:avLst/>
-            </a:prstGeom>
-            <a:solidFill>
-              <a:schemeClr val="bg1">
-                <a:lumMod val="95000"/>
-              </a:schemeClr>
-            </a:solidFill>
-          </p:spPr>
-          <p:style>
-            <a:lnRef idx="2">
-              <a:schemeClr val="accent1">
-                <a:shade val="50000"/>
-              </a:schemeClr>
-            </a:lnRef>
-            <a:fillRef idx="1">
-              <a:schemeClr val="accent1"/>
-            </a:fillRef>
-            <a:effectRef idx="0">
-              <a:schemeClr val="accent1"/>
-            </a:effectRef>
-            <a:fontRef idx="minor">
-              <a:schemeClr val="lt1"/>
-            </a:fontRef>
-          </p:style>
-          <p:txBody>
-            <a:bodyPr rtlCol="0" anchor="ctr"/>
-            <a:lstStyle/>
-            <a:p>
-              <a:pPr algn="ctr"/>
-              <a:endParaRPr lang="en-US"/>
-            </a:p>
-          </p:txBody>
-        </p:sp>
-        <p:sp>
-          <p:nvSpPr>
-            <p:cNvPr id="242" name="TextBox 241"/>
-            <p:cNvSpPr txBox="1"/>
-            <p:nvPr/>
-          </p:nvSpPr>
-          <p:spPr>
-            <a:xfrm>
-              <a:off x="2590800" y="5638800"/>
-              <a:ext cx="1219200" cy="307777"/>
-            </a:xfrm>
-            <a:prstGeom prst="rect">
-              <a:avLst/>
-            </a:prstGeom>
-            <a:noFill/>
-          </p:spPr>
-          <p:txBody>
-            <a:bodyPr wrap="square" rtlCol="0">
-              <a:spAutoFit/>
-            </a:bodyPr>
-            <a:lstStyle/>
-            <a:p>
-              <a:r>
-                <a:rPr lang="en-US" sz="1400" dirty="0" smtClean="0"/>
-                <a:t>See Crowds</a:t>
-              </a:r>
-              <a:endParaRPr lang="en-US" dirty="0" smtClean="0"/>
-            </a:p>
-          </p:txBody>
-        </p:sp>
-        <p:cxnSp>
-          <p:nvCxnSpPr>
-            <p:cNvPr id="243" name="Straight Arrow Connector 242"/>
-            <p:cNvCxnSpPr/>
-            <p:nvPr/>
-          </p:nvCxnSpPr>
-          <p:spPr>
-            <a:xfrm>
-              <a:off x="3810000" y="5787001"/>
-              <a:ext cx="1066800" cy="4199"/>
-            </a:xfrm>
-            <a:prstGeom prst="straightConnector1">
-              <a:avLst/>
-            </a:prstGeom>
-            <a:ln>
-              <a:tailEnd type="arrow"/>
-            </a:ln>
-          </p:spPr>
-          <p:style>
-            <a:lnRef idx="1">
-              <a:schemeClr val="accent1"/>
-            </a:lnRef>
-            <a:fillRef idx="0">
-              <a:schemeClr val="accent1"/>
-            </a:fillRef>
-            <a:effectRef idx="0">
-              <a:schemeClr val="accent1"/>
-            </a:effectRef>
-            <a:fontRef idx="minor">
-              <a:schemeClr val="tx1"/>
-            </a:fontRef>
-          </p:style>
-        </p:cxnSp>
-        <p:sp>
-          <p:nvSpPr>
-            <p:cNvPr id="244" name="TextBox 243"/>
-            <p:cNvSpPr txBox="1"/>
-            <p:nvPr/>
-          </p:nvSpPr>
-          <p:spPr>
-            <a:xfrm>
-              <a:off x="3733800" y="5562600"/>
-              <a:ext cx="1447800" cy="461665"/>
-            </a:xfrm>
-            <a:prstGeom prst="rect">
-              <a:avLst/>
-            </a:prstGeom>
-            <a:noFill/>
-          </p:spPr>
-          <p:txBody>
-            <a:bodyPr wrap="square" rtlCol="0">
-              <a:spAutoFit/>
-            </a:bodyPr>
-            <a:lstStyle/>
-            <a:p>
-              <a:r>
-                <a:rPr lang="en-US" sz="1200" i="1" dirty="0" smtClean="0"/>
-                <a:t>Crowd Locations</a:t>
-              </a:r>
-              <a:endParaRPr lang="en-US" sz="1400" i="1" dirty="0" smtClean="0"/>
-            </a:p>
-            <a:p>
-              <a:r>
-                <a:rPr lang="en-US" sz="1200" i="1" dirty="0" smtClean="0"/>
-                <a:t>(</a:t>
-              </a:r>
-              <a:r>
-                <a:rPr lang="en-US" sz="1200" i="1" dirty="0" err="1" smtClean="0"/>
-                <a:t>blockableCrowds</a:t>
-              </a:r>
-              <a:r>
-                <a:rPr lang="en-US" sz="1200" i="1" dirty="0" smtClean="0"/>
-                <a:t>)</a:t>
-              </a:r>
-              <a:endParaRPr lang="en-US" sz="1400" i="1" dirty="0"/>
-            </a:p>
-          </p:txBody>
-        </p:sp>
-      </p:grpSp>
       <p:grpSp>
         <p:nvGrpSpPr>
           <p:cNvPr id="252" name="Group 251"/>
@@ -6562,7 +4985,7 @@
         <p:spPr>
           <a:xfrm>
             <a:off x="6781800" y="990600"/>
-            <a:ext cx="1371600" cy="307777"/>
+            <a:ext cx="990600" cy="523220"/>
           </a:xfrm>
           <a:prstGeom prst="rect">
             <a:avLst/>
@@ -6637,7 +5060,7 @@
         </p:nvSpPr>
         <p:spPr>
           <a:xfrm>
-            <a:off x="6324600" y="4495800"/>
+            <a:off x="6324600" y="4419600"/>
             <a:ext cx="762000" cy="523220"/>
           </a:xfrm>
           <a:prstGeom prst="rect">
@@ -6675,7 +5098,7 @@
         </p:nvSpPr>
         <p:spPr>
           <a:xfrm>
-            <a:off x="6400800" y="6019800"/>
+            <a:off x="6400800" y="5943600"/>
             <a:ext cx="762000" cy="523220"/>
           </a:xfrm>
           <a:prstGeom prst="rect">
@@ -6743,8 +5166,8 @@
         </p:nvSpPr>
         <p:spPr>
           <a:xfrm>
-            <a:off x="1066800" y="381000"/>
-            <a:ext cx="990600" cy="461665"/>
+            <a:off x="914400" y="1143000"/>
+            <a:ext cx="685800" cy="461665"/>
           </a:xfrm>
           <a:prstGeom prst="rect">
             <a:avLst/>
@@ -6758,13 +5181,744 @@
           <a:lstStyle/>
           <a:p>
             <a:r>
-              <a:rPr lang="en-US" sz="1200" dirty="0" smtClean="0"/>
-              <a:t>TODO: name this</a:t>
-            </a:r>
-            <a:endParaRPr lang="en-US" sz="1200" dirty="0"/>
-          </a:p>
-        </p:txBody>
-      </p:sp>
+              <a:rPr lang="en-US" sz="1200" i="1" dirty="0" smtClean="0"/>
+              <a:t>video frames</a:t>
+            </a:r>
+            <a:endParaRPr lang="en-US" sz="1200" i="1" dirty="0"/>
+          </a:p>
+        </p:txBody>
+      </p:sp>
+      <p:grpSp>
+        <p:nvGrpSpPr>
+          <p:cNvPr id="121" name="Group 120"/>
+          <p:cNvGrpSpPr/>
+          <p:nvPr/>
+        </p:nvGrpSpPr>
+        <p:grpSpPr>
+          <a:xfrm>
+            <a:off x="1600200" y="914400"/>
+            <a:ext cx="1219200" cy="474658"/>
+            <a:chOff x="3276600" y="304800"/>
+            <a:chExt cx="1219200" cy="474658"/>
+          </a:xfrm>
+        </p:grpSpPr>
+        <p:sp>
+          <p:nvSpPr>
+            <p:cNvPr id="125" name="Rectangle 124"/>
+            <p:cNvSpPr/>
+            <p:nvPr/>
+          </p:nvSpPr>
+          <p:spPr>
+            <a:xfrm>
+              <a:off x="3276600" y="304800"/>
+              <a:ext cx="1125415" cy="474658"/>
+            </a:xfrm>
+            <a:prstGeom prst="rect">
+              <a:avLst/>
+            </a:prstGeom>
+            <a:solidFill>
+              <a:schemeClr val="bg1">
+                <a:lumMod val="95000"/>
+              </a:schemeClr>
+            </a:solidFill>
+          </p:spPr>
+          <p:style>
+            <a:lnRef idx="2">
+              <a:schemeClr val="accent1">
+                <a:shade val="50000"/>
+              </a:schemeClr>
+            </a:lnRef>
+            <a:fillRef idx="1">
+              <a:schemeClr val="accent1"/>
+            </a:fillRef>
+            <a:effectRef idx="0">
+              <a:schemeClr val="accent1"/>
+            </a:effectRef>
+            <a:fontRef idx="minor">
+              <a:schemeClr val="lt1"/>
+            </a:fontRef>
+          </p:style>
+          <p:txBody>
+            <a:bodyPr rtlCol="0" anchor="ctr"/>
+            <a:lstStyle/>
+            <a:p>
+              <a:pPr algn="ctr"/>
+              <a:endParaRPr lang="en-US"/>
+            </a:p>
+          </p:txBody>
+        </p:sp>
+        <p:sp>
+          <p:nvSpPr>
+            <p:cNvPr id="127" name="TextBox 126"/>
+            <p:cNvSpPr txBox="1"/>
+            <p:nvPr/>
+          </p:nvSpPr>
+          <p:spPr>
+            <a:xfrm>
+              <a:off x="3276600" y="381000"/>
+              <a:ext cx="1219200" cy="307777"/>
+            </a:xfrm>
+            <a:prstGeom prst="rect">
+              <a:avLst/>
+            </a:prstGeom>
+            <a:noFill/>
+          </p:spPr>
+          <p:txBody>
+            <a:bodyPr wrap="square" rtlCol="0">
+              <a:spAutoFit/>
+            </a:bodyPr>
+            <a:lstStyle/>
+            <a:p>
+              <a:r>
+                <a:rPr lang="en-US" sz="1400" dirty="0" smtClean="0"/>
+                <a:t>See Crowds</a:t>
+              </a:r>
+              <a:endParaRPr lang="en-US" dirty="0" smtClean="0"/>
+            </a:p>
+          </p:txBody>
+        </p:sp>
+      </p:grpSp>
+      <p:sp>
+        <p:nvSpPr>
+          <p:cNvPr id="142" name="TextBox 141"/>
+          <p:cNvSpPr txBox="1"/>
+          <p:nvPr/>
+        </p:nvSpPr>
+        <p:spPr>
+          <a:xfrm>
+            <a:off x="2743200" y="914400"/>
+            <a:ext cx="1447800" cy="461665"/>
+          </a:xfrm>
+          <a:prstGeom prst="rect">
+            <a:avLst/>
+          </a:prstGeom>
+          <a:noFill/>
+        </p:spPr>
+        <p:txBody>
+          <a:bodyPr wrap="square" rtlCol="0">
+            <a:spAutoFit/>
+          </a:bodyPr>
+          <a:lstStyle/>
+          <a:p>
+            <a:r>
+              <a:rPr lang="en-US" sz="1200" i="1" dirty="0" smtClean="0"/>
+              <a:t>Crowd Locations</a:t>
+            </a:r>
+            <a:endParaRPr lang="en-US" sz="1400" i="1" dirty="0" smtClean="0"/>
+          </a:p>
+          <a:p>
+            <a:r>
+              <a:rPr lang="en-US" sz="1200" i="1" dirty="0" smtClean="0"/>
+              <a:t>(</a:t>
+            </a:r>
+            <a:r>
+              <a:rPr lang="en-US" sz="1200" i="1" dirty="0" err="1" smtClean="0"/>
+              <a:t>blockableCrowds</a:t>
+            </a:r>
+            <a:r>
+              <a:rPr lang="en-US" sz="1200" i="1" dirty="0" smtClean="0"/>
+              <a:t>)</a:t>
+            </a:r>
+            <a:endParaRPr lang="en-US" sz="1400" i="1" dirty="0"/>
+          </a:p>
+        </p:txBody>
+      </p:sp>
+      <p:cxnSp>
+        <p:nvCxnSpPr>
+          <p:cNvPr id="143" name="Elbow Connector 142"/>
+          <p:cNvCxnSpPr>
+            <a:stCxn id="125" idx="3"/>
+          </p:cNvCxnSpPr>
+          <p:nvPr/>
+        </p:nvCxnSpPr>
+        <p:spPr>
+          <a:xfrm flipV="1">
+            <a:off x="2725615" y="762000"/>
+            <a:ext cx="2151185" cy="389729"/>
+          </a:xfrm>
+          <a:prstGeom prst="bentConnector3">
+            <a:avLst>
+              <a:gd name="adj1" fmla="val 64169"/>
+            </a:avLst>
+          </a:prstGeom>
+          <a:ln w="22225">
+            <a:solidFill>
+              <a:schemeClr val="accent1"/>
+            </a:solidFill>
+            <a:tailEnd type="arrow"/>
+          </a:ln>
+        </p:spPr>
+        <p:style>
+          <a:lnRef idx="1">
+            <a:schemeClr val="accent1"/>
+          </a:lnRef>
+          <a:fillRef idx="0">
+            <a:schemeClr val="accent1"/>
+          </a:fillRef>
+          <a:effectRef idx="0">
+            <a:schemeClr val="accent1"/>
+          </a:effectRef>
+          <a:fontRef idx="minor">
+            <a:schemeClr val="tx1"/>
+          </a:fontRef>
+        </p:style>
+      </p:cxnSp>
+      <p:cxnSp>
+        <p:nvCxnSpPr>
+          <p:cNvPr id="144" name="Straight Arrow Connector 143"/>
+          <p:cNvCxnSpPr/>
+          <p:nvPr/>
+        </p:nvCxnSpPr>
+        <p:spPr>
+          <a:xfrm>
+            <a:off x="4114800" y="2514600"/>
+            <a:ext cx="762000" cy="0"/>
+          </a:xfrm>
+          <a:prstGeom prst="straightConnector1">
+            <a:avLst/>
+          </a:prstGeom>
+          <a:ln w="22225">
+            <a:tailEnd type="arrow"/>
+          </a:ln>
+        </p:spPr>
+        <p:style>
+          <a:lnRef idx="1">
+            <a:schemeClr val="accent1"/>
+          </a:lnRef>
+          <a:fillRef idx="0">
+            <a:schemeClr val="accent1"/>
+          </a:fillRef>
+          <a:effectRef idx="0">
+            <a:schemeClr val="accent1"/>
+          </a:effectRef>
+          <a:fontRef idx="minor">
+            <a:schemeClr val="tx1"/>
+          </a:fontRef>
+        </p:style>
+      </p:cxnSp>
+      <p:cxnSp>
+        <p:nvCxnSpPr>
+          <p:cNvPr id="145" name="Straight Arrow Connector 144"/>
+          <p:cNvCxnSpPr/>
+          <p:nvPr/>
+        </p:nvCxnSpPr>
+        <p:spPr>
+          <a:xfrm>
+            <a:off x="4114800" y="5867400"/>
+            <a:ext cx="762000" cy="0"/>
+          </a:xfrm>
+          <a:prstGeom prst="straightConnector1">
+            <a:avLst/>
+          </a:prstGeom>
+          <a:ln w="22225">
+            <a:tailEnd type="arrow"/>
+          </a:ln>
+        </p:spPr>
+        <p:style>
+          <a:lnRef idx="1">
+            <a:schemeClr val="accent1"/>
+          </a:lnRef>
+          <a:fillRef idx="0">
+            <a:schemeClr val="accent1"/>
+          </a:fillRef>
+          <a:effectRef idx="0">
+            <a:schemeClr val="accent1"/>
+          </a:effectRef>
+          <a:fontRef idx="minor">
+            <a:schemeClr val="tx1"/>
+          </a:fontRef>
+        </p:style>
+      </p:cxnSp>
+      <p:cxnSp>
+        <p:nvCxnSpPr>
+          <p:cNvPr id="146" name="Straight Connector 145"/>
+          <p:cNvCxnSpPr/>
+          <p:nvPr/>
+        </p:nvCxnSpPr>
+        <p:spPr>
+          <a:xfrm flipV="1">
+            <a:off x="4114800" y="1143000"/>
+            <a:ext cx="0" cy="4724400"/>
+          </a:xfrm>
+          <a:prstGeom prst="line">
+            <a:avLst/>
+          </a:prstGeom>
+          <a:ln w="22225"/>
+        </p:spPr>
+        <p:style>
+          <a:lnRef idx="1">
+            <a:schemeClr val="accent1"/>
+          </a:lnRef>
+          <a:fillRef idx="0">
+            <a:schemeClr val="accent1"/>
+          </a:fillRef>
+          <a:effectRef idx="0">
+            <a:schemeClr val="accent1"/>
+          </a:effectRef>
+          <a:fontRef idx="minor">
+            <a:schemeClr val="tx1"/>
+          </a:fontRef>
+        </p:style>
+      </p:cxnSp>
+      <p:sp>
+        <p:nvSpPr>
+          <p:cNvPr id="152" name="TextBox 151"/>
+          <p:cNvSpPr txBox="1"/>
+          <p:nvPr/>
+        </p:nvSpPr>
+        <p:spPr>
+          <a:xfrm>
+            <a:off x="3048000" y="533400"/>
+            <a:ext cx="762000" cy="646331"/>
+          </a:xfrm>
+          <a:prstGeom prst="rect">
+            <a:avLst/>
+          </a:prstGeom>
+          <a:noFill/>
+        </p:spPr>
+        <p:txBody>
+          <a:bodyPr wrap="square" rtlCol="0">
+            <a:spAutoFit/>
+          </a:bodyPr>
+          <a:lstStyle/>
+          <a:p>
+            <a:endParaRPr lang="en-US" dirty="0" smtClean="0"/>
+          </a:p>
+          <a:p>
+            <a:endParaRPr lang="en-US" dirty="0"/>
+          </a:p>
+        </p:txBody>
+      </p:sp>
+      <p:grpSp>
+        <p:nvGrpSpPr>
+          <p:cNvPr id="161" name="Group 121"/>
+          <p:cNvGrpSpPr/>
+          <p:nvPr/>
+        </p:nvGrpSpPr>
+        <p:grpSpPr>
+          <a:xfrm>
+            <a:off x="1524000" y="4419600"/>
+            <a:ext cx="1219200" cy="533400"/>
+            <a:chOff x="2590800" y="2819400"/>
+            <a:chExt cx="1219200" cy="533400"/>
+          </a:xfrm>
+        </p:grpSpPr>
+        <p:sp>
+          <p:nvSpPr>
+            <p:cNvPr id="164" name="Rectangle 163"/>
+            <p:cNvSpPr/>
+            <p:nvPr/>
+          </p:nvSpPr>
+          <p:spPr>
+            <a:xfrm>
+              <a:off x="2590800" y="2819400"/>
+              <a:ext cx="1125415" cy="474658"/>
+            </a:xfrm>
+            <a:prstGeom prst="rect">
+              <a:avLst/>
+            </a:prstGeom>
+            <a:solidFill>
+              <a:schemeClr val="bg1">
+                <a:lumMod val="95000"/>
+              </a:schemeClr>
+            </a:solidFill>
+          </p:spPr>
+          <p:style>
+            <a:lnRef idx="2">
+              <a:schemeClr val="accent1">
+                <a:shade val="50000"/>
+              </a:schemeClr>
+            </a:lnRef>
+            <a:fillRef idx="1">
+              <a:schemeClr val="accent1"/>
+            </a:fillRef>
+            <a:effectRef idx="0">
+              <a:schemeClr val="accent1"/>
+            </a:effectRef>
+            <a:fontRef idx="minor">
+              <a:schemeClr val="lt1"/>
+            </a:fontRef>
+          </p:style>
+          <p:txBody>
+            <a:bodyPr rtlCol="0" anchor="ctr"/>
+            <a:lstStyle/>
+            <a:p>
+              <a:pPr algn="ctr"/>
+              <a:endParaRPr lang="en-US"/>
+            </a:p>
+          </p:txBody>
+        </p:sp>
+        <p:sp>
+          <p:nvSpPr>
+            <p:cNvPr id="165" name="TextBox 164"/>
+            <p:cNvSpPr txBox="1"/>
+            <p:nvPr/>
+          </p:nvSpPr>
+          <p:spPr>
+            <a:xfrm>
+              <a:off x="2590800" y="2887202"/>
+              <a:ext cx="1219200" cy="465598"/>
+            </a:xfrm>
+            <a:prstGeom prst="rect">
+              <a:avLst/>
+            </a:prstGeom>
+            <a:noFill/>
+          </p:spPr>
+          <p:txBody>
+            <a:bodyPr wrap="square" rtlCol="0">
+              <a:spAutoFit/>
+            </a:bodyPr>
+            <a:lstStyle/>
+            <a:p>
+              <a:r>
+                <a:rPr lang="en-US" sz="1400" dirty="0" err="1" smtClean="0"/>
+                <a:t>LocalizeUAV</a:t>
+              </a:r>
+              <a:endParaRPr lang="en-US" dirty="0" smtClean="0"/>
+            </a:p>
+          </p:txBody>
+        </p:sp>
+      </p:grpSp>
+      <p:sp>
+        <p:nvSpPr>
+          <p:cNvPr id="163" name="TextBox 162"/>
+          <p:cNvSpPr txBox="1"/>
+          <p:nvPr/>
+        </p:nvSpPr>
+        <p:spPr>
+          <a:xfrm>
+            <a:off x="2590800" y="4648200"/>
+            <a:ext cx="914400" cy="307777"/>
+          </a:xfrm>
+          <a:prstGeom prst="rect">
+            <a:avLst/>
+          </a:prstGeom>
+          <a:noFill/>
+        </p:spPr>
+        <p:txBody>
+          <a:bodyPr wrap="square" rtlCol="0">
+            <a:spAutoFit/>
+          </a:bodyPr>
+          <a:lstStyle/>
+          <a:p>
+            <a:r>
+              <a:rPr lang="en-US" sz="1400" i="1" dirty="0" smtClean="0"/>
+              <a:t>Hallway</a:t>
+            </a:r>
+            <a:endParaRPr lang="en-US" sz="1400" i="1" dirty="0"/>
+          </a:p>
+        </p:txBody>
+      </p:sp>
+      <p:cxnSp>
+        <p:nvCxnSpPr>
+          <p:cNvPr id="172" name="Straight Arrow Connector 171"/>
+          <p:cNvCxnSpPr>
+            <a:stCxn id="14" idx="3"/>
+            <a:endCxn id="164" idx="1"/>
+          </p:cNvCxnSpPr>
+          <p:nvPr/>
+        </p:nvCxnSpPr>
+        <p:spPr>
+          <a:xfrm flipV="1">
+            <a:off x="914400" y="4656929"/>
+            <a:ext cx="609600" cy="23537"/>
+          </a:xfrm>
+          <a:prstGeom prst="straightConnector1">
+            <a:avLst/>
+          </a:prstGeom>
+          <a:ln w="22225">
+            <a:solidFill>
+              <a:schemeClr val="accent2"/>
+            </a:solidFill>
+            <a:tailEnd type="arrow"/>
+          </a:ln>
+        </p:spPr>
+        <p:style>
+          <a:lnRef idx="1">
+            <a:schemeClr val="accent1"/>
+          </a:lnRef>
+          <a:fillRef idx="0">
+            <a:schemeClr val="accent1"/>
+          </a:fillRef>
+          <a:effectRef idx="0">
+            <a:schemeClr val="accent1"/>
+          </a:effectRef>
+          <a:fontRef idx="minor">
+            <a:schemeClr val="tx1"/>
+          </a:fontRef>
+        </p:style>
+      </p:cxnSp>
+      <p:sp>
+        <p:nvSpPr>
+          <p:cNvPr id="177" name="TextBox 176"/>
+          <p:cNvSpPr txBox="1"/>
+          <p:nvPr/>
+        </p:nvSpPr>
+        <p:spPr>
+          <a:xfrm>
+            <a:off x="914400" y="4648200"/>
+            <a:ext cx="685800" cy="461665"/>
+          </a:xfrm>
+          <a:prstGeom prst="rect">
+            <a:avLst/>
+          </a:prstGeom>
+          <a:noFill/>
+        </p:spPr>
+        <p:txBody>
+          <a:bodyPr wrap="square" rtlCol="0">
+            <a:spAutoFit/>
+          </a:bodyPr>
+          <a:lstStyle/>
+          <a:p>
+            <a:r>
+              <a:rPr lang="en-US" sz="1200" i="1" dirty="0" smtClean="0"/>
+              <a:t>UAV location</a:t>
+            </a:r>
+            <a:endParaRPr lang="en-US" sz="1200" i="1" dirty="0"/>
+          </a:p>
+        </p:txBody>
+      </p:sp>
+      <p:cxnSp>
+        <p:nvCxnSpPr>
+          <p:cNvPr id="190" name="Straight Arrow Connector 189"/>
+          <p:cNvCxnSpPr/>
+          <p:nvPr/>
+        </p:nvCxnSpPr>
+        <p:spPr>
+          <a:xfrm flipV="1">
+            <a:off x="914400" y="1144489"/>
+            <a:ext cx="685800" cy="744"/>
+          </a:xfrm>
+          <a:prstGeom prst="straightConnector1">
+            <a:avLst/>
+          </a:prstGeom>
+          <a:ln w="22225">
+            <a:tailEnd type="arrow"/>
+          </a:ln>
+        </p:spPr>
+        <p:style>
+          <a:lnRef idx="1">
+            <a:schemeClr val="accent1"/>
+          </a:lnRef>
+          <a:fillRef idx="0">
+            <a:schemeClr val="accent1"/>
+          </a:fillRef>
+          <a:effectRef idx="0">
+            <a:schemeClr val="accent1"/>
+          </a:effectRef>
+          <a:fontRef idx="minor">
+            <a:schemeClr val="tx1"/>
+          </a:fontRef>
+        </p:style>
+      </p:cxnSp>
+      <p:cxnSp>
+        <p:nvCxnSpPr>
+          <p:cNvPr id="192" name="Elbow Connector 191"/>
+          <p:cNvCxnSpPr>
+            <a:stCxn id="164" idx="3"/>
+          </p:cNvCxnSpPr>
+          <p:nvPr/>
+        </p:nvCxnSpPr>
+        <p:spPr>
+          <a:xfrm>
+            <a:off x="2649415" y="4656929"/>
+            <a:ext cx="2227385" cy="1820071"/>
+          </a:xfrm>
+          <a:prstGeom prst="bentConnector3">
+            <a:avLst>
+              <a:gd name="adj1" fmla="val 31962"/>
+            </a:avLst>
+          </a:prstGeom>
+          <a:ln w="22225">
+            <a:solidFill>
+              <a:schemeClr val="accent2"/>
+            </a:solidFill>
+            <a:tailEnd type="arrow"/>
+          </a:ln>
+        </p:spPr>
+        <p:style>
+          <a:lnRef idx="1">
+            <a:schemeClr val="accent1"/>
+          </a:lnRef>
+          <a:fillRef idx="0">
+            <a:schemeClr val="accent1"/>
+          </a:fillRef>
+          <a:effectRef idx="0">
+            <a:schemeClr val="accent1"/>
+          </a:effectRef>
+          <a:fontRef idx="minor">
+            <a:schemeClr val="tx1"/>
+          </a:fontRef>
+        </p:style>
+      </p:cxnSp>
+      <p:cxnSp>
+        <p:nvCxnSpPr>
+          <p:cNvPr id="195" name="Straight Connector 194"/>
+          <p:cNvCxnSpPr/>
+          <p:nvPr/>
+        </p:nvCxnSpPr>
+        <p:spPr>
+          <a:xfrm flipV="1">
+            <a:off x="3352800" y="1447800"/>
+            <a:ext cx="0" cy="3200400"/>
+          </a:xfrm>
+          <a:prstGeom prst="line">
+            <a:avLst/>
+          </a:prstGeom>
+          <a:ln w="22225">
+            <a:solidFill>
+              <a:schemeClr val="accent2"/>
+            </a:solidFill>
+          </a:ln>
+        </p:spPr>
+        <p:style>
+          <a:lnRef idx="1">
+            <a:schemeClr val="accent1"/>
+          </a:lnRef>
+          <a:fillRef idx="0">
+            <a:schemeClr val="accent1"/>
+          </a:fillRef>
+          <a:effectRef idx="0">
+            <a:schemeClr val="accent1"/>
+          </a:effectRef>
+          <a:fontRef idx="minor">
+            <a:schemeClr val="tx1"/>
+          </a:fontRef>
+        </p:style>
+      </p:cxnSp>
+      <p:cxnSp>
+        <p:nvCxnSpPr>
+          <p:cNvPr id="202" name="Straight Arrow Connector 201"/>
+          <p:cNvCxnSpPr/>
+          <p:nvPr/>
+        </p:nvCxnSpPr>
+        <p:spPr>
+          <a:xfrm>
+            <a:off x="3352800" y="4724400"/>
+            <a:ext cx="1524000" cy="0"/>
+          </a:xfrm>
+          <a:prstGeom prst="straightConnector1">
+            <a:avLst/>
+          </a:prstGeom>
+          <a:ln w="22225">
+            <a:solidFill>
+              <a:schemeClr val="accent2"/>
+            </a:solidFill>
+            <a:tailEnd type="arrow"/>
+          </a:ln>
+        </p:spPr>
+        <p:style>
+          <a:lnRef idx="1">
+            <a:schemeClr val="accent1"/>
+          </a:lnRef>
+          <a:fillRef idx="0">
+            <a:schemeClr val="accent1"/>
+          </a:fillRef>
+          <a:effectRef idx="0">
+            <a:schemeClr val="accent1"/>
+          </a:effectRef>
+          <a:fontRef idx="minor">
+            <a:schemeClr val="tx1"/>
+          </a:fontRef>
+        </p:style>
+      </p:cxnSp>
+      <p:cxnSp>
+        <p:nvCxnSpPr>
+          <p:cNvPr id="218" name="Straight Arrow Connector 217"/>
+          <p:cNvCxnSpPr/>
+          <p:nvPr/>
+        </p:nvCxnSpPr>
+        <p:spPr>
+          <a:xfrm>
+            <a:off x="3352800" y="1447800"/>
+            <a:ext cx="1524000" cy="0"/>
+          </a:xfrm>
+          <a:prstGeom prst="straightConnector1">
+            <a:avLst/>
+          </a:prstGeom>
+          <a:ln w="22225">
+            <a:solidFill>
+              <a:schemeClr val="accent2"/>
+            </a:solidFill>
+            <a:tailEnd type="arrow"/>
+          </a:ln>
+        </p:spPr>
+        <p:style>
+          <a:lnRef idx="1">
+            <a:schemeClr val="accent1"/>
+          </a:lnRef>
+          <a:fillRef idx="0">
+            <a:schemeClr val="accent1"/>
+          </a:fillRef>
+          <a:effectRef idx="0">
+            <a:schemeClr val="accent1"/>
+          </a:effectRef>
+          <a:fontRef idx="minor">
+            <a:schemeClr val="tx1"/>
+          </a:fontRef>
+        </p:style>
+      </p:cxnSp>
+      <p:cxnSp>
+        <p:nvCxnSpPr>
+          <p:cNvPr id="220" name="Straight Arrow Connector 219"/>
+          <p:cNvCxnSpPr/>
+          <p:nvPr/>
+        </p:nvCxnSpPr>
+        <p:spPr>
+          <a:xfrm>
+            <a:off x="3352800" y="3124200"/>
+            <a:ext cx="1524000" cy="0"/>
+          </a:xfrm>
+          <a:prstGeom prst="straightConnector1">
+            <a:avLst/>
+          </a:prstGeom>
+          <a:ln w="22225">
+            <a:solidFill>
+              <a:schemeClr val="accent2"/>
+            </a:solidFill>
+            <a:tailEnd type="arrow"/>
+          </a:ln>
+        </p:spPr>
+        <p:style>
+          <a:lnRef idx="1">
+            <a:schemeClr val="accent1"/>
+          </a:lnRef>
+          <a:fillRef idx="0">
+            <a:schemeClr val="accent1"/>
+          </a:fillRef>
+          <a:effectRef idx="0">
+            <a:schemeClr val="accent1"/>
+          </a:effectRef>
+          <a:fontRef idx="minor">
+            <a:schemeClr val="tx1"/>
+          </a:fontRef>
+        </p:style>
+      </p:cxnSp>
+    </p:spTree>
+  </p:cSld>
+  <p:clrMapOvr>
+    <a:masterClrMapping/>
+  </p:clrMapOvr>
+</p:sld>
+</file>
+
+<file path=ppt/slides/slide2.xml><?xml version="1.0" encoding="utf-8"?>
+<p:sld xmlns:a="http://schemas.openxmlformats.org/drawingml/2006/main" xmlns:r="http://schemas.openxmlformats.org/officeDocument/2006/relationships" xmlns:p="http://schemas.openxmlformats.org/presentationml/2006/main">
+  <p:cSld>
+    <p:spTree>
+      <p:nvGrpSpPr>
+        <p:cNvPr id="1" name=""/>
+        <p:cNvGrpSpPr/>
+        <p:nvPr/>
+      </p:nvGrpSpPr>
+      <p:grpSpPr>
+        <a:xfrm>
+          <a:off x="0" y="0"/>
+          <a:ext cx="0" cy="0"/>
+          <a:chOff x="0" y="0"/>
+          <a:chExt cx="0" cy="0"/>
+        </a:xfrm>
+      </p:grpSpPr>
     </p:spTree>
   </p:cSld>
   <p:clrMapOvr>

</xml_diff>

<commit_message>
added behavior tier key (top right)
</commit_message>
<xml_diff>
--- a/UAVbehavior/TRM/Diagrams/Overall behavior subsumption.pptx
+++ b/UAVbehavior/TRM/Diagrams/Overall behavior subsumption.pptx
@@ -4064,8 +4064,8 @@
         </p:nvCxnSpPr>
         <p:spPr>
           <a:xfrm>
-            <a:off x="685800" y="3505200"/>
-            <a:ext cx="7315200" cy="0"/>
+            <a:off x="2438400" y="3505200"/>
+            <a:ext cx="5562600" cy="0"/>
           </a:xfrm>
           <a:prstGeom prst="line">
             <a:avLst/>
@@ -4103,8 +4103,8 @@
         </p:nvCxnSpPr>
         <p:spPr>
           <a:xfrm>
-            <a:off x="685800" y="1828800"/>
-            <a:ext cx="7315200" cy="0"/>
+            <a:off x="2438400" y="1828800"/>
+            <a:ext cx="5562600" cy="0"/>
           </a:xfrm>
           <a:prstGeom prst="line">
             <a:avLst/>
@@ -4181,8 +4181,8 @@
         </p:nvSpPr>
         <p:spPr>
           <a:xfrm>
-            <a:off x="0" y="0"/>
-            <a:ext cx="914400" cy="307777"/>
+            <a:off x="0" y="1"/>
+            <a:ext cx="1219200" cy="369332"/>
           </a:xfrm>
           <a:prstGeom prst="rect">
             <a:avLst/>
@@ -4196,10 +4196,10 @@
           <a:lstStyle/>
           <a:p>
             <a:r>
-              <a:rPr lang="en-US" sz="1400" dirty="0" smtClean="0"/>
+              <a:rPr lang="en-US" dirty="0" smtClean="0"/>
               <a:t>Strategic</a:t>
             </a:r>
-            <a:endParaRPr lang="en-US" dirty="0"/>
+            <a:endParaRPr lang="en-US" sz="2400" dirty="0"/>
           </a:p>
         </p:txBody>
       </p:sp>
@@ -4211,8 +4211,8 @@
         </p:nvSpPr>
         <p:spPr>
           <a:xfrm>
-            <a:off x="0" y="6550223"/>
-            <a:ext cx="914400" cy="307777"/>
+            <a:off x="0" y="6553199"/>
+            <a:ext cx="1143000" cy="400110"/>
           </a:xfrm>
           <a:prstGeom prst="rect">
             <a:avLst/>
@@ -4226,9 +4226,10 @@
           <a:lstStyle/>
           <a:p>
             <a:r>
-              <a:rPr lang="en-US" sz="1400" dirty="0" smtClean="0"/>
+              <a:rPr lang="en-US" sz="2000" dirty="0" smtClean="0"/>
               <a:t>Tactical</a:t>
             </a:r>
+            <a:endParaRPr lang="en-US" sz="1400" dirty="0" smtClean="0"/>
           </a:p>
         </p:txBody>
       </p:sp>
@@ -5894,6 +5895,91 @@
           </a:fontRef>
         </p:style>
       </p:cxnSp>
+      <p:sp>
+        <p:nvSpPr>
+          <p:cNvPr id="95" name="Rectangle 94"/>
+          <p:cNvSpPr/>
+          <p:nvPr/>
+        </p:nvSpPr>
+        <p:spPr>
+          <a:xfrm>
+            <a:off x="7315200" y="0"/>
+            <a:ext cx="1828800" cy="990600"/>
+          </a:xfrm>
+          <a:prstGeom prst="rect">
+            <a:avLst/>
+          </a:prstGeom>
+          <a:solidFill>
+            <a:schemeClr val="bg2"/>
+          </a:solidFill>
+        </p:spPr>
+        <p:style>
+          <a:lnRef idx="2">
+            <a:schemeClr val="accent1">
+              <a:shade val="50000"/>
+            </a:schemeClr>
+          </a:lnRef>
+          <a:fillRef idx="1">
+            <a:schemeClr val="accent1"/>
+          </a:fillRef>
+          <a:effectRef idx="0">
+            <a:schemeClr val="accent1"/>
+          </a:effectRef>
+          <a:fontRef idx="minor">
+            <a:schemeClr val="lt1"/>
+          </a:fontRef>
+        </p:style>
+        <p:txBody>
+          <a:bodyPr rtlCol="0" anchor="ctr"/>
+          <a:lstStyle/>
+          <a:p>
+            <a:pPr algn="ctr"/>
+            <a:endParaRPr lang="en-US"/>
+          </a:p>
+        </p:txBody>
+      </p:sp>
+      <p:sp>
+        <p:nvSpPr>
+          <p:cNvPr id="98" name="TextBox 97"/>
+          <p:cNvSpPr txBox="1"/>
+          <p:nvPr/>
+        </p:nvSpPr>
+        <p:spPr>
+          <a:xfrm>
+            <a:off x="7315200" y="0"/>
+            <a:ext cx="1828800" cy="923330"/>
+          </a:xfrm>
+          <a:prstGeom prst="rect">
+            <a:avLst/>
+          </a:prstGeom>
+          <a:noFill/>
+        </p:spPr>
+        <p:txBody>
+          <a:bodyPr wrap="square" rtlCol="0">
+            <a:spAutoFit/>
+          </a:bodyPr>
+          <a:lstStyle/>
+          <a:p>
+            <a:r>
+              <a:rPr lang="en-US" b="1" dirty="0" smtClean="0"/>
+              <a:t>Threatening    2</a:t>
+            </a:r>
+          </a:p>
+          <a:p>
+            <a:r>
+              <a:rPr lang="en-US" b="1" dirty="0" smtClean="0"/>
+              <a:t>Approaching   1</a:t>
+            </a:r>
+          </a:p>
+          <a:p>
+            <a:r>
+              <a:rPr lang="en-US" b="1" dirty="0" smtClean="0"/>
+              <a:t>Watching         0</a:t>
+            </a:r>
+            <a:endParaRPr lang="en-US" b="1" dirty="0"/>
+          </a:p>
+        </p:txBody>
+      </p:sp>
     </p:spTree>
   </p:cSld>
   <p:clrMapOvr>

</xml_diff>

<commit_message>
changed camera output label
</commit_message>
<xml_diff>
--- a/UAVbehavior/TRM/Diagrams/Overall behavior subsumption.pptx
+++ b/UAVbehavior/TRM/Diagrams/Overall behavior subsumption.pptx
@@ -5168,7 +5168,7 @@
         <p:spPr>
           <a:xfrm>
             <a:off x="914400" y="1143000"/>
-            <a:ext cx="685800" cy="461665"/>
+            <a:ext cx="762000" cy="830997"/>
           </a:xfrm>
           <a:prstGeom prst="rect">
             <a:avLst/>
@@ -5183,7 +5183,7 @@
           <a:p>
             <a:r>
               <a:rPr lang="en-US" sz="1200" i="1" dirty="0" smtClean="0"/>
-              <a:t>video frames</a:t>
+              <a:t>camera-centric crowd vectors</a:t>
             </a:r>
             <a:endParaRPr lang="en-US" sz="1200" i="1" dirty="0"/>
           </a:p>
@@ -5687,7 +5687,7 @@
         </p:nvCxnSpPr>
         <p:spPr>
           <a:xfrm flipV="1">
-            <a:off x="914400" y="1144489"/>
+            <a:off x="914400" y="1143000"/>
             <a:ext cx="685800" cy="744"/>
           </a:xfrm>
           <a:prstGeom prst="straightConnector1">

</xml_diff>